<commit_message>
Update to Workshop and ReadMe
</commit_message>
<xml_diff>
--- a/BigData_Intro.pptx
+++ b/BigData_Intro.pptx
@@ -243,7 +243,7 @@
           <a:p>
             <a:fld id="{B36D61BC-D97E-4621-A406-6D7D11D2A1E0}" type="datetimeFigureOut">
               <a:rPr lang="en-US" smtClean="0"/>
-              <a:t>5/18/2020</a:t>
+              <a:t>3/8/2023</a:t>
             </a:fld>
             <a:endParaRPr lang="en-US"/>
           </a:p>
@@ -307,38 +307,37 @@
           <a:p>
             <a:pPr lvl="0"/>
             <a:r>
-              <a:rPr lang="en-US" smtClean="0"/>
+              <a:rPr lang="en-US"/>
               <a:t>Edit Master text styles</a:t>
             </a:r>
           </a:p>
           <a:p>
             <a:pPr lvl="1"/>
             <a:r>
-              <a:rPr lang="en-US" smtClean="0"/>
+              <a:rPr lang="en-US"/>
               <a:t>Second level</a:t>
             </a:r>
           </a:p>
           <a:p>
             <a:pPr lvl="2"/>
             <a:r>
-              <a:rPr lang="en-US" smtClean="0"/>
+              <a:rPr lang="en-US"/>
               <a:t>Third level</a:t>
             </a:r>
           </a:p>
           <a:p>
             <a:pPr lvl="3"/>
             <a:r>
-              <a:rPr lang="en-US" smtClean="0"/>
+              <a:rPr lang="en-US"/>
               <a:t>Fourth level</a:t>
             </a:r>
           </a:p>
           <a:p>
             <a:pPr lvl="4"/>
             <a:r>
-              <a:rPr lang="en-US" smtClean="0"/>
+              <a:rPr lang="en-US"/>
               <a:t>Fifth level</a:t>
             </a:r>
-            <a:endParaRPr lang="en-US"/>
           </a:p>
         </p:txBody>
       </p:sp>
@@ -556,7 +555,7 @@
           <a:lstStyle/>
           <a:p>
             <a:r>
-              <a:rPr lang="en-US" sz="1200" b="0" i="0" kern="1200" dirty="0" smtClean="0">
+              <a:rPr lang="en-US" sz="1200" b="0" i="0" kern="1200" dirty="0">
                 <a:solidFill>
                   <a:schemeClr val="tx1"/>
                 </a:solidFill>
@@ -569,7 +568,7 @@
             </a:r>
           </a:p>
           <a:p>
-            <a:endParaRPr lang="en-US" sz="1200" b="0" i="0" kern="1200" dirty="0" smtClean="0">
+            <a:endParaRPr lang="en-US" sz="1200" b="0" i="0" kern="1200" dirty="0">
               <a:solidFill>
                 <a:schemeClr val="tx1"/>
               </a:solidFill>
@@ -580,10 +579,10 @@
             </a:endParaRPr>
           </a:p>
           <a:p>
-            <a:endParaRPr lang="en-US" dirty="0" smtClean="0"/>
-          </a:p>
-          <a:p>
-            <a:endParaRPr lang="en-US" dirty="0" smtClean="0"/>
+            <a:endParaRPr lang="en-US" dirty="0"/>
+          </a:p>
+          <a:p>
+            <a:endParaRPr lang="en-US" dirty="0"/>
           </a:p>
           <a:p>
             <a:endParaRPr lang="en-US" dirty="0"/>
@@ -688,20 +687,20 @@
               <a:defRPr/>
             </a:pPr>
             <a:r>
-              <a:rPr lang="en-US" dirty="0" smtClean="0"/>
+              <a:rPr lang="en-US" dirty="0"/>
               <a:t>At LexisNexis we use HPCC Systems to collect data from 1000s of sources like public records (property, court records) and private (Driver Motor Vehicle, telematics). We ingest the data, clean it, link it and then analyze it. The goal of the LN services is to identify risky individuals or businesses for insurance (driving and life), financial services (loans, credit cards etc.) and government (track fraudsters, criminals like sex offenders, drug traffickers and money launderers). </a:t>
             </a:r>
           </a:p>
           <a:p>
             <a:r>
-              <a:rPr lang="en-US" dirty="0" smtClean="0"/>
+              <a:rPr lang="en-US" dirty="0"/>
               <a:t>HPCC System</a:t>
             </a:r>
             <a:r>
-              <a:rPr lang="en-US" baseline="0" dirty="0" smtClean="0"/>
+              <a:rPr lang="en-US" baseline="0" dirty="0"/>
               <a:t> is capable of handling and processing batch data (processing data in massive amount).  Real time services refers to ability real time data and processing it that same time. Driving information is great example, data is sent in real time and gets processed immediately.  Visualization Integration refers to the ability of adding graphs, tables and visualization to big data processing. </a:t>
             </a:r>
-            <a:endParaRPr lang="en-US" dirty="0" smtClean="0"/>
+            <a:endParaRPr lang="en-US" dirty="0"/>
           </a:p>
           <a:p>
             <a:endParaRPr lang="en-US" dirty="0"/>
@@ -806,12 +805,12 @@
               <a:defRPr/>
             </a:pPr>
             <a:r>
-              <a:rPr lang="en-US" dirty="0" smtClean="0"/>
+              <a:rPr lang="en-US" dirty="0"/>
               <a:t>Big Data processing in traditional computing like relational systems is hard. HPCC Systems data lake technology uses a divide and conquer approach to solving Big Data problems by dividing data into smaller chunks and running compute on these chunks in parallel. This means faster processing and hence results. </a:t>
             </a:r>
           </a:p>
           <a:p>
-            <a:endParaRPr lang="en-US" dirty="0" smtClean="0"/>
+            <a:endParaRPr lang="en-US" dirty="0"/>
           </a:p>
           <a:p>
             <a:endParaRPr lang="en-US" dirty="0"/>
@@ -916,12 +915,12 @@
               <a:defRPr/>
             </a:pPr>
             <a:r>
-              <a:rPr lang="en-US" dirty="0" smtClean="0"/>
+              <a:rPr lang="en-US" dirty="0"/>
               <a:t>Workers in industries such as oil rigs and manufacturing factories are always at a risk of injuries from accidents. Over 4000 workers die on the industrial floor every year. The time to react to an accident is very slow and expensive.    </a:t>
             </a:r>
           </a:p>
           <a:p>
-            <a:endParaRPr lang="en-US" dirty="0" smtClean="0"/>
+            <a:endParaRPr lang="en-US" dirty="0"/>
           </a:p>
           <a:p>
             <a:endParaRPr lang="en-US" dirty="0"/>
@@ -1009,45 +1008,45 @@
           <a:lstStyle/>
           <a:p>
             <a:r>
-              <a:rPr lang="en-US" dirty="0" smtClean="0"/>
+              <a:rPr lang="en-US" dirty="0"/>
               <a:t>With the help of </a:t>
             </a:r>
             <a:r>
-              <a:rPr lang="en-US" dirty="0" err="1" smtClean="0"/>
+              <a:rPr lang="en-US" dirty="0" err="1"/>
               <a:t>IoT</a:t>
             </a:r>
             <a:r>
-              <a:rPr lang="en-US" dirty="0" smtClean="0"/>
+              <a:rPr lang="en-US" dirty="0"/>
               <a:t> and HPCC Systems, </a:t>
             </a:r>
             <a:r>
-              <a:rPr lang="en-US" dirty="0" err="1" smtClean="0"/>
+              <a:rPr lang="en-US" dirty="0" err="1"/>
               <a:t>Guardhat</a:t>
             </a:r>
             <a:r>
-              <a:rPr lang="en-US" dirty="0" smtClean="0"/>
+              <a:rPr lang="en-US" dirty="0"/>
               <a:t> was able to create a solution that, one, enabled proactive actions to potentially avoid accidents and, two, react quickly if there was an accident. The solution involved creating protective smart hats that are equipped with </a:t>
             </a:r>
             <a:r>
-              <a:rPr lang="en-US" dirty="0" err="1" smtClean="0"/>
+              <a:rPr lang="en-US" dirty="0" err="1"/>
               <a:t>IoT</a:t>
             </a:r>
             <a:r>
-              <a:rPr lang="en-US" dirty="0" smtClean="0"/>
+              <a:rPr lang="en-US" dirty="0"/>
               <a:t> sensors to detect atmospheric parameters like pressure, CO levels, O2 levels etc. In addition to enabling video and audio detection of events. </a:t>
             </a:r>
           </a:p>
           <a:p>
-            <a:endParaRPr lang="en-US" dirty="0" smtClean="0"/>
+            <a:endParaRPr lang="en-US" dirty="0"/>
           </a:p>
           <a:p>
             <a:r>
-              <a:rPr lang="en-US" dirty="0" smtClean="0"/>
+              <a:rPr lang="en-US" dirty="0"/>
               <a:t>HPCC Systems provides the platform that is used to collect the sensor data and process it for analysis. HPCC Systems AI algorithms are used to predict potential  events (like fires) before they can occur. </a:t>
             </a:r>
           </a:p>
           <a:p>
-            <a:endParaRPr lang="en-US" smtClean="0"/>
+            <a:endParaRPr lang="en-US"/>
           </a:p>
           <a:p>
             <a:endParaRPr lang="en-US"/>
@@ -1250,7 +1249,7 @@
           </a:lstStyle>
           <a:p>
             <a:r>
-              <a:rPr lang="en-US" smtClean="0"/>
+              <a:rPr lang="en-US"/>
               <a:t>Click to edit Master title style</a:t>
             </a:r>
             <a:endParaRPr lang="en-US" dirty="0"/>
@@ -1346,7 +1345,7 @@
           </a:lstStyle>
           <a:p>
             <a:r>
-              <a:rPr lang="en-US" smtClean="0"/>
+              <a:rPr lang="en-US"/>
               <a:t>Click to edit Master subtitle style</a:t>
             </a:r>
             <a:endParaRPr lang="en-US" dirty="0"/>
@@ -1370,7 +1369,7 @@
           <a:p>
             <a:fld id="{4AAD347D-5ACD-4C99-B74B-A9C85AD731AF}" type="datetimeFigureOut">
               <a:rPr lang="en-US" smtClean="0"/>
-              <a:t>5/18/2020</a:t>
+              <a:t>3/8/2023</a:t>
             </a:fld>
             <a:endParaRPr lang="en-US" dirty="0"/>
           </a:p>
@@ -1473,7 +1472,7 @@
           </a:lstStyle>
           <a:p>
             <a:r>
-              <a:rPr lang="en-US" smtClean="0"/>
+              <a:rPr lang="en-US"/>
               <a:t>Click to edit Master title style</a:t>
             </a:r>
             <a:endParaRPr lang="en-US" dirty="0"/>
@@ -1538,7 +1537,7 @@
           </a:lstStyle>
           <a:p>
             <a:r>
-              <a:rPr lang="en-US" smtClean="0"/>
+              <a:rPr lang="en-US"/>
               <a:t>Click icon to add picture</a:t>
             </a:r>
             <a:endParaRPr lang="en-US" dirty="0"/>
@@ -1628,7 +1627,7 @@
           <a:p>
             <a:pPr lvl="0"/>
             <a:r>
-              <a:rPr lang="en-US" smtClean="0"/>
+              <a:rPr lang="en-US"/>
               <a:t>Edit Master text styles</a:t>
             </a:r>
           </a:p>
@@ -1651,7 +1650,7 @@
           <a:p>
             <a:fld id="{4509A250-FF31-4206-8172-F9D3106AACB1}" type="datetimeFigureOut">
               <a:rPr lang="en-US" smtClean="0"/>
-              <a:t>5/18/2020</a:t>
+              <a:t>3/8/2023</a:t>
             </a:fld>
             <a:endParaRPr lang="en-US" dirty="0"/>
           </a:p>
@@ -1754,7 +1753,7 @@
           </a:lstStyle>
           <a:p>
             <a:r>
-              <a:rPr lang="en-US" smtClean="0"/>
+              <a:rPr lang="en-US"/>
               <a:t>Click to edit Master title style</a:t>
             </a:r>
             <a:endParaRPr lang="en-US" dirty="0"/>
@@ -1820,7 +1819,7 @@
           <a:p>
             <a:pPr lvl="0"/>
             <a:r>
-              <a:rPr lang="en-US" smtClean="0"/>
+              <a:rPr lang="en-US"/>
               <a:t>Edit Master text styles</a:t>
             </a:r>
           </a:p>
@@ -1843,7 +1842,7 @@
           <a:p>
             <a:fld id="{4509A250-FF31-4206-8172-F9D3106AACB1}" type="datetimeFigureOut">
               <a:rPr lang="en-US" smtClean="0"/>
-              <a:t>5/18/2020</a:t>
+              <a:t>3/8/2023</a:t>
             </a:fld>
             <a:endParaRPr lang="en-US" dirty="0"/>
           </a:p>
@@ -1946,7 +1945,7 @@
           </a:lstStyle>
           <a:p>
             <a:r>
-              <a:rPr lang="en-US" smtClean="0"/>
+              <a:rPr lang="en-US"/>
               <a:t>Click to edit Master title style</a:t>
             </a:r>
             <a:endParaRPr lang="en-US" dirty="0"/>
@@ -2014,7 +2013,7 @@
           <a:p>
             <a:pPr lvl="0"/>
             <a:r>
-              <a:rPr lang="en-US" smtClean="0"/>
+              <a:rPr lang="en-US"/>
               <a:t>Edit Master text styles</a:t>
             </a:r>
           </a:p>
@@ -2081,7 +2080,7 @@
           <a:p>
             <a:pPr lvl="0"/>
             <a:r>
-              <a:rPr lang="en-US" smtClean="0"/>
+              <a:rPr lang="en-US"/>
               <a:t>Edit Master text styles</a:t>
             </a:r>
           </a:p>
@@ -2104,7 +2103,7 @@
           <a:p>
             <a:fld id="{4AAD347D-5ACD-4C99-B74B-A9C85AD731AF}" type="datetimeFigureOut">
               <a:rPr lang="en-US" smtClean="0"/>
-              <a:t>5/18/2020</a:t>
+              <a:t>3/8/2023</a:t>
             </a:fld>
             <a:endParaRPr lang="en-US" dirty="0"/>
           </a:p>
@@ -2442,7 +2441,7 @@
           </a:lstStyle>
           <a:p>
             <a:r>
-              <a:rPr lang="en-US" smtClean="0"/>
+              <a:rPr lang="en-US"/>
               <a:t>Click to edit Master title style</a:t>
             </a:r>
             <a:endParaRPr lang="en-US" dirty="0"/>
@@ -2508,7 +2507,7 @@
           <a:p>
             <a:pPr lvl="0"/>
             <a:r>
-              <a:rPr lang="en-US" smtClean="0"/>
+              <a:rPr lang="en-US"/>
               <a:t>Edit Master text styles</a:t>
             </a:r>
           </a:p>
@@ -2531,7 +2530,7 @@
           <a:p>
             <a:fld id="{4AAD347D-5ACD-4C99-B74B-A9C85AD731AF}" type="datetimeFigureOut">
               <a:rPr lang="en-US" smtClean="0"/>
-              <a:t>5/18/2020</a:t>
+              <a:t>3/8/2023</a:t>
             </a:fld>
             <a:endParaRPr lang="en-US" dirty="0"/>
           </a:p>
@@ -2631,7 +2630,7 @@
           <a:lstStyle/>
           <a:p>
             <a:r>
-              <a:rPr lang="en-US" smtClean="0"/>
+              <a:rPr lang="en-US"/>
               <a:t>Click to edit Master title style</a:t>
             </a:r>
             <a:endParaRPr lang="en-US" dirty="0"/>
@@ -2726,7 +2725,7 @@
           <a:p>
             <a:pPr lvl="0"/>
             <a:r>
-              <a:rPr lang="en-US" smtClean="0"/>
+              <a:rPr lang="en-US"/>
               <a:t>Edit Master text styles</a:t>
             </a:r>
           </a:p>
@@ -2793,7 +2792,7 @@
           <a:p>
             <a:pPr lvl="0"/>
             <a:r>
-              <a:rPr lang="en-US" smtClean="0"/>
+              <a:rPr lang="en-US"/>
               <a:t>Edit Master text styles</a:t>
             </a:r>
           </a:p>
@@ -2857,7 +2856,7 @@
               <a:buNone/>
             </a:pPr>
             <a:r>
-              <a:rPr lang="en-US" smtClean="0"/>
+              <a:rPr lang="en-US"/>
               <a:t>Edit Master text styles</a:t>
             </a:r>
           </a:p>
@@ -2924,7 +2923,7 @@
           <a:p>
             <a:pPr lvl="0"/>
             <a:r>
-              <a:rPr lang="en-US" smtClean="0"/>
+              <a:rPr lang="en-US"/>
               <a:t>Edit Master text styles</a:t>
             </a:r>
           </a:p>
@@ -2988,7 +2987,7 @@
               <a:buNone/>
             </a:pPr>
             <a:r>
-              <a:rPr lang="en-US" smtClean="0"/>
+              <a:rPr lang="en-US"/>
               <a:t>Edit Master text styles</a:t>
             </a:r>
           </a:p>
@@ -3055,7 +3054,7 @@
           <a:p>
             <a:pPr lvl="0"/>
             <a:r>
-              <a:rPr lang="en-US" smtClean="0"/>
+              <a:rPr lang="en-US"/>
               <a:t>Edit Master text styles</a:t>
             </a:r>
           </a:p>
@@ -3078,7 +3077,7 @@
           <a:p>
             <a:fld id="{4509A250-FF31-4206-8172-F9D3106AACB1}" type="datetimeFigureOut">
               <a:rPr lang="en-US" smtClean="0"/>
-              <a:t>5/18/2020</a:t>
+              <a:t>3/8/2023</a:t>
             </a:fld>
             <a:endParaRPr lang="en-US" dirty="0"/>
           </a:p>
@@ -3177,7 +3176,7 @@
           <a:lstStyle/>
           <a:p>
             <a:r>
-              <a:rPr lang="en-US" smtClean="0"/>
+              <a:rPr lang="en-US"/>
               <a:t>Click to edit Master title style</a:t>
             </a:r>
             <a:endParaRPr lang="en-US" dirty="0"/>
@@ -3268,7 +3267,7 @@
           <a:p>
             <a:pPr lvl="0"/>
             <a:r>
-              <a:rPr lang="en-US" smtClean="0"/>
+              <a:rPr lang="en-US"/>
               <a:t>Edit Master text styles</a:t>
             </a:r>
           </a:p>
@@ -3346,7 +3345,7 @@
           </a:lstStyle>
           <a:p>
             <a:r>
-              <a:rPr lang="en-US" smtClean="0"/>
+              <a:rPr lang="en-US"/>
               <a:t>Click icon to add picture</a:t>
             </a:r>
             <a:endParaRPr lang="en-US" dirty="0"/>
@@ -3414,7 +3413,7 @@
           <a:p>
             <a:pPr lvl="0"/>
             <a:r>
-              <a:rPr lang="en-US" smtClean="0"/>
+              <a:rPr lang="en-US"/>
               <a:t>Edit Master text styles</a:t>
             </a:r>
           </a:p>
@@ -3504,7 +3503,7 @@
           <a:p>
             <a:pPr lvl="0"/>
             <a:r>
-              <a:rPr lang="en-US" smtClean="0"/>
+              <a:rPr lang="en-US"/>
               <a:t>Edit Master text styles</a:t>
             </a:r>
           </a:p>
@@ -3582,7 +3581,7 @@
           </a:lstStyle>
           <a:p>
             <a:r>
-              <a:rPr lang="en-US" smtClean="0"/>
+              <a:rPr lang="en-US"/>
               <a:t>Click icon to add picture</a:t>
             </a:r>
             <a:endParaRPr lang="en-US" dirty="0"/>
@@ -3650,7 +3649,7 @@
           <a:p>
             <a:pPr lvl="0"/>
             <a:r>
-              <a:rPr lang="en-US" smtClean="0"/>
+              <a:rPr lang="en-US"/>
               <a:t>Edit Master text styles</a:t>
             </a:r>
           </a:p>
@@ -3740,7 +3739,7 @@
           <a:p>
             <a:pPr lvl="0"/>
             <a:r>
-              <a:rPr lang="en-US" smtClean="0"/>
+              <a:rPr lang="en-US"/>
               <a:t>Edit Master text styles</a:t>
             </a:r>
           </a:p>
@@ -3818,7 +3817,7 @@
           </a:lstStyle>
           <a:p>
             <a:r>
-              <a:rPr lang="en-US" smtClean="0"/>
+              <a:rPr lang="en-US"/>
               <a:t>Click icon to add picture</a:t>
             </a:r>
             <a:endParaRPr lang="en-US" dirty="0"/>
@@ -3886,7 +3885,7 @@
           <a:p>
             <a:pPr lvl="0"/>
             <a:r>
-              <a:rPr lang="en-US" smtClean="0"/>
+              <a:rPr lang="en-US"/>
               <a:t>Edit Master text styles</a:t>
             </a:r>
           </a:p>
@@ -3909,7 +3908,7 @@
           <a:p>
             <a:fld id="{4509A250-FF31-4206-8172-F9D3106AACB1}" type="datetimeFigureOut">
               <a:rPr lang="en-US" smtClean="0"/>
-              <a:t>5/18/2020</a:t>
+              <a:t>3/8/2023</a:t>
             </a:fld>
             <a:endParaRPr lang="en-US" dirty="0"/>
           </a:p>
@@ -4003,7 +4002,7 @@
           <a:lstStyle/>
           <a:p>
             <a:r>
-              <a:rPr lang="en-US" smtClean="0"/>
+              <a:rPr lang="en-US"/>
               <a:t>Click to edit Master title style</a:t>
             </a:r>
             <a:endParaRPr lang="en-US" dirty="0"/>
@@ -4027,35 +4026,35 @@
           <a:p>
             <a:pPr lvl="0"/>
             <a:r>
-              <a:rPr lang="en-US" smtClean="0"/>
+              <a:rPr lang="en-US"/>
               <a:t>Edit Master text styles</a:t>
             </a:r>
           </a:p>
           <a:p>
             <a:pPr lvl="1"/>
             <a:r>
-              <a:rPr lang="en-US" smtClean="0"/>
+              <a:rPr lang="en-US"/>
               <a:t>Second level</a:t>
             </a:r>
           </a:p>
           <a:p>
             <a:pPr lvl="2"/>
             <a:r>
-              <a:rPr lang="en-US" smtClean="0"/>
+              <a:rPr lang="en-US"/>
               <a:t>Third level</a:t>
             </a:r>
           </a:p>
           <a:p>
             <a:pPr lvl="3"/>
             <a:r>
-              <a:rPr lang="en-US" smtClean="0"/>
+              <a:rPr lang="en-US"/>
               <a:t>Fourth level</a:t>
             </a:r>
           </a:p>
           <a:p>
             <a:pPr lvl="4"/>
             <a:r>
-              <a:rPr lang="en-US" smtClean="0"/>
+              <a:rPr lang="en-US"/>
               <a:t>Fifth level</a:t>
             </a:r>
             <a:endParaRPr lang="en-US" dirty="0"/>
@@ -4079,7 +4078,7 @@
           <a:p>
             <a:fld id="{4509A250-FF31-4206-8172-F9D3106AACB1}" type="datetimeFigureOut">
               <a:rPr lang="en-US" smtClean="0"/>
-              <a:t>5/18/2020</a:t>
+              <a:t>3/8/2023</a:t>
             </a:fld>
             <a:endParaRPr lang="en-US" dirty="0"/>
           </a:p>
@@ -4178,7 +4177,7 @@
           <a:lstStyle/>
           <a:p>
             <a:r>
-              <a:rPr lang="en-US" smtClean="0"/>
+              <a:rPr lang="en-US"/>
               <a:t>Click to edit Master title style</a:t>
             </a:r>
             <a:endParaRPr lang="en-US" dirty="0"/>
@@ -4207,35 +4206,35 @@
           <a:p>
             <a:pPr lvl="0"/>
             <a:r>
-              <a:rPr lang="en-US" smtClean="0"/>
+              <a:rPr lang="en-US"/>
               <a:t>Edit Master text styles</a:t>
             </a:r>
           </a:p>
           <a:p>
             <a:pPr lvl="1"/>
             <a:r>
-              <a:rPr lang="en-US" smtClean="0"/>
+              <a:rPr lang="en-US"/>
               <a:t>Second level</a:t>
             </a:r>
           </a:p>
           <a:p>
             <a:pPr lvl="2"/>
             <a:r>
-              <a:rPr lang="en-US" smtClean="0"/>
+              <a:rPr lang="en-US"/>
               <a:t>Third level</a:t>
             </a:r>
           </a:p>
           <a:p>
             <a:pPr lvl="3"/>
             <a:r>
-              <a:rPr lang="en-US" smtClean="0"/>
+              <a:rPr lang="en-US"/>
               <a:t>Fourth level</a:t>
             </a:r>
           </a:p>
           <a:p>
             <a:pPr lvl="4"/>
             <a:r>
-              <a:rPr lang="en-US" smtClean="0"/>
+              <a:rPr lang="en-US"/>
               <a:t>Fifth level</a:t>
             </a:r>
             <a:endParaRPr lang="en-US" dirty="0"/>
@@ -4259,7 +4258,7 @@
           <a:p>
             <a:fld id="{4509A250-FF31-4206-8172-F9D3106AACB1}" type="datetimeFigureOut">
               <a:rPr lang="en-US" smtClean="0"/>
-              <a:t>5/18/2020</a:t>
+              <a:t>3/8/2023</a:t>
             </a:fld>
             <a:endParaRPr lang="en-US" dirty="0"/>
           </a:p>
@@ -4353,7 +4352,7 @@
           <a:lstStyle/>
           <a:p>
             <a:r>
-              <a:rPr lang="en-US" smtClean="0"/>
+              <a:rPr lang="en-US"/>
               <a:t>Click to edit Master title style</a:t>
             </a:r>
             <a:endParaRPr lang="en-US" dirty="0"/>
@@ -4377,35 +4376,35 @@
           <a:p>
             <a:pPr lvl="0"/>
             <a:r>
-              <a:rPr lang="en-US" smtClean="0"/>
+              <a:rPr lang="en-US"/>
               <a:t>Edit Master text styles</a:t>
             </a:r>
           </a:p>
           <a:p>
             <a:pPr lvl="1"/>
             <a:r>
-              <a:rPr lang="en-US" smtClean="0"/>
+              <a:rPr lang="en-US"/>
               <a:t>Second level</a:t>
             </a:r>
           </a:p>
           <a:p>
             <a:pPr lvl="2"/>
             <a:r>
-              <a:rPr lang="en-US" smtClean="0"/>
+              <a:rPr lang="en-US"/>
               <a:t>Third level</a:t>
             </a:r>
           </a:p>
           <a:p>
             <a:pPr lvl="3"/>
             <a:r>
-              <a:rPr lang="en-US" smtClean="0"/>
+              <a:rPr lang="en-US"/>
               <a:t>Fourth level</a:t>
             </a:r>
           </a:p>
           <a:p>
             <a:pPr lvl="4"/>
             <a:r>
-              <a:rPr lang="en-US" smtClean="0"/>
+              <a:rPr lang="en-US"/>
               <a:t>Fifth level</a:t>
             </a:r>
             <a:endParaRPr lang="en-US" dirty="0"/>
@@ -4429,7 +4428,7 @@
           <a:p>
             <a:fld id="{4509A250-FF31-4206-8172-F9D3106AACB1}" type="datetimeFigureOut">
               <a:rPr lang="en-US" smtClean="0"/>
-              <a:t>5/18/2020</a:t>
+              <a:t>3/8/2023</a:t>
             </a:fld>
             <a:endParaRPr lang="en-US" dirty="0"/>
           </a:p>
@@ -4566,7 +4565,7 @@
           </a:lstStyle>
           <a:p>
             <a:r>
-              <a:rPr lang="en-US" smtClean="0"/>
+              <a:rPr lang="en-US"/>
               <a:t>Click to edit Master title style</a:t>
             </a:r>
             <a:endParaRPr lang="en-US" dirty="0"/>
@@ -4662,7 +4661,7 @@
           </a:lstStyle>
           <a:p>
             <a:r>
-              <a:rPr lang="en-US" smtClean="0"/>
+              <a:rPr lang="en-US"/>
               <a:t>Click to edit Master subtitle style</a:t>
             </a:r>
             <a:endParaRPr lang="en-US" dirty="0"/>
@@ -4686,7 +4685,7 @@
           <a:p>
             <a:fld id="{9796027F-7875-4030-9381-8BD8C4F21935}" type="datetimeFigureOut">
               <a:rPr lang="en-US" smtClean="0"/>
-              <a:t>5/18/2020</a:t>
+              <a:t>3/8/2023</a:t>
             </a:fld>
             <a:endParaRPr lang="en-US" dirty="0"/>
           </a:p>
@@ -4780,7 +4779,7 @@
           <a:lstStyle/>
           <a:p>
             <a:r>
-              <a:rPr lang="en-US" smtClean="0"/>
+              <a:rPr lang="en-US"/>
               <a:t>Click to edit Master title style</a:t>
             </a:r>
             <a:endParaRPr lang="en-US" dirty="0"/>
@@ -4809,35 +4808,35 @@
           <a:p>
             <a:pPr lvl="0"/>
             <a:r>
-              <a:rPr lang="en-US" smtClean="0"/>
+              <a:rPr lang="en-US"/>
               <a:t>Edit Master text styles</a:t>
             </a:r>
           </a:p>
           <a:p>
             <a:pPr lvl="1"/>
             <a:r>
-              <a:rPr lang="en-US" smtClean="0"/>
+              <a:rPr lang="en-US"/>
               <a:t>Second level</a:t>
             </a:r>
           </a:p>
           <a:p>
             <a:pPr lvl="2"/>
             <a:r>
-              <a:rPr lang="en-US" smtClean="0"/>
+              <a:rPr lang="en-US"/>
               <a:t>Third level</a:t>
             </a:r>
           </a:p>
           <a:p>
             <a:pPr lvl="3"/>
             <a:r>
-              <a:rPr lang="en-US" smtClean="0"/>
+              <a:rPr lang="en-US"/>
               <a:t>Fourth level</a:t>
             </a:r>
           </a:p>
           <a:p>
             <a:pPr lvl="4"/>
             <a:r>
-              <a:rPr lang="en-US" smtClean="0"/>
+              <a:rPr lang="en-US"/>
               <a:t>Fifth level</a:t>
             </a:r>
             <a:endParaRPr lang="en-US" dirty="0"/>
@@ -4866,35 +4865,35 @@
           <a:p>
             <a:pPr lvl="0"/>
             <a:r>
-              <a:rPr lang="en-US" smtClean="0"/>
+              <a:rPr lang="en-US"/>
               <a:t>Edit Master text styles</a:t>
             </a:r>
           </a:p>
           <a:p>
             <a:pPr lvl="1"/>
             <a:r>
-              <a:rPr lang="en-US" smtClean="0"/>
+              <a:rPr lang="en-US"/>
               <a:t>Second level</a:t>
             </a:r>
           </a:p>
           <a:p>
             <a:pPr lvl="2"/>
             <a:r>
-              <a:rPr lang="en-US" smtClean="0"/>
+              <a:rPr lang="en-US"/>
               <a:t>Third level</a:t>
             </a:r>
           </a:p>
           <a:p>
             <a:pPr lvl="3"/>
             <a:r>
-              <a:rPr lang="en-US" smtClean="0"/>
+              <a:rPr lang="en-US"/>
               <a:t>Fourth level</a:t>
             </a:r>
           </a:p>
           <a:p>
             <a:pPr lvl="4"/>
             <a:r>
-              <a:rPr lang="en-US" smtClean="0"/>
+              <a:rPr lang="en-US"/>
               <a:t>Fifth level</a:t>
             </a:r>
             <a:endParaRPr lang="en-US" dirty="0"/>
@@ -4918,7 +4917,7 @@
           <a:p>
             <a:fld id="{9796027F-7875-4030-9381-8BD8C4F21935}" type="datetimeFigureOut">
               <a:rPr lang="en-US" smtClean="0"/>
-              <a:t>5/18/2020</a:t>
+              <a:t>3/8/2023</a:t>
             </a:fld>
             <a:endParaRPr lang="en-US" dirty="0"/>
           </a:p>
@@ -5017,7 +5016,7 @@
           <a:lstStyle/>
           <a:p>
             <a:r>
-              <a:rPr lang="en-US" smtClean="0"/>
+              <a:rPr lang="en-US"/>
               <a:t>Click to edit Master title style</a:t>
             </a:r>
             <a:endParaRPr lang="en-US" dirty="0"/>
@@ -5110,7 +5109,7 @@
           <a:p>
             <a:pPr lvl="0"/>
             <a:r>
-              <a:rPr lang="en-US" smtClean="0"/>
+              <a:rPr lang="en-US"/>
               <a:t>Edit Master text styles</a:t>
             </a:r>
           </a:p>
@@ -5138,35 +5137,35 @@
           <a:p>
             <a:pPr lvl="0"/>
             <a:r>
-              <a:rPr lang="en-US" smtClean="0"/>
+              <a:rPr lang="en-US"/>
               <a:t>Edit Master text styles</a:t>
             </a:r>
           </a:p>
           <a:p>
             <a:pPr lvl="1"/>
             <a:r>
-              <a:rPr lang="en-US" smtClean="0"/>
+              <a:rPr lang="en-US"/>
               <a:t>Second level</a:t>
             </a:r>
           </a:p>
           <a:p>
             <a:pPr lvl="2"/>
             <a:r>
-              <a:rPr lang="en-US" smtClean="0"/>
+              <a:rPr lang="en-US"/>
               <a:t>Third level</a:t>
             </a:r>
           </a:p>
           <a:p>
             <a:pPr lvl="3"/>
             <a:r>
-              <a:rPr lang="en-US" smtClean="0"/>
+              <a:rPr lang="en-US"/>
               <a:t>Fourth level</a:t>
             </a:r>
           </a:p>
           <a:p>
             <a:pPr lvl="4"/>
             <a:r>
-              <a:rPr lang="en-US" smtClean="0"/>
+              <a:rPr lang="en-US"/>
               <a:t>Fifth level</a:t>
             </a:r>
             <a:endParaRPr lang="en-US" dirty="0"/>
@@ -5231,7 +5230,7 @@
               <a:buNone/>
             </a:pPr>
             <a:r>
-              <a:rPr lang="en-US" smtClean="0"/>
+              <a:rPr lang="en-US"/>
               <a:t>Edit Master text styles</a:t>
             </a:r>
           </a:p>
@@ -5259,35 +5258,35 @@
           <a:p>
             <a:pPr lvl="0"/>
             <a:r>
-              <a:rPr lang="en-US" smtClean="0"/>
+              <a:rPr lang="en-US"/>
               <a:t>Edit Master text styles</a:t>
             </a:r>
           </a:p>
           <a:p>
             <a:pPr lvl="1"/>
             <a:r>
-              <a:rPr lang="en-US" smtClean="0"/>
+              <a:rPr lang="en-US"/>
               <a:t>Second level</a:t>
             </a:r>
           </a:p>
           <a:p>
             <a:pPr lvl="2"/>
             <a:r>
-              <a:rPr lang="en-US" smtClean="0"/>
+              <a:rPr lang="en-US"/>
               <a:t>Third level</a:t>
             </a:r>
           </a:p>
           <a:p>
             <a:pPr lvl="3"/>
             <a:r>
-              <a:rPr lang="en-US" smtClean="0"/>
+              <a:rPr lang="en-US"/>
               <a:t>Fourth level</a:t>
             </a:r>
           </a:p>
           <a:p>
             <a:pPr lvl="4"/>
             <a:r>
-              <a:rPr lang="en-US" smtClean="0"/>
+              <a:rPr lang="en-US"/>
               <a:t>Fifth level</a:t>
             </a:r>
             <a:endParaRPr lang="en-US" dirty="0"/>
@@ -5311,7 +5310,7 @@
           <a:p>
             <a:fld id="{9796027F-7875-4030-9381-8BD8C4F21935}" type="datetimeFigureOut">
               <a:rPr lang="en-US" smtClean="0"/>
-              <a:t>5/18/2020</a:t>
+              <a:t>3/8/2023</a:t>
             </a:fld>
             <a:endParaRPr lang="en-US" dirty="0"/>
           </a:p>
@@ -5405,7 +5404,7 @@
           <a:lstStyle/>
           <a:p>
             <a:r>
-              <a:rPr lang="en-US" smtClean="0"/>
+              <a:rPr lang="en-US"/>
               <a:t>Click to edit Master title style</a:t>
             </a:r>
             <a:endParaRPr lang="en-US" dirty="0"/>
@@ -5429,7 +5428,7 @@
           <a:p>
             <a:fld id="{4509A250-FF31-4206-8172-F9D3106AACB1}" type="datetimeFigureOut">
               <a:rPr lang="en-US" smtClean="0"/>
-              <a:t>5/18/2020</a:t>
+              <a:t>3/8/2023</a:t>
             </a:fld>
             <a:endParaRPr lang="en-US" dirty="0"/>
           </a:p>
@@ -5524,7 +5523,7 @@
           <a:p>
             <a:fld id="{4509A250-FF31-4206-8172-F9D3106AACB1}" type="datetimeFigureOut">
               <a:rPr lang="en-US" smtClean="0"/>
-              <a:t>5/18/2020</a:t>
+              <a:t>3/8/2023</a:t>
             </a:fld>
             <a:endParaRPr lang="en-US" dirty="0"/>
           </a:p>
@@ -5627,7 +5626,7 @@
           </a:lstStyle>
           <a:p>
             <a:r>
-              <a:rPr lang="en-US" smtClean="0"/>
+              <a:rPr lang="en-US"/>
               <a:t>Click to edit Master title style</a:t>
             </a:r>
             <a:endParaRPr lang="en-US" dirty="0"/>
@@ -5656,35 +5655,35 @@
           <a:p>
             <a:pPr lvl="0"/>
             <a:r>
-              <a:rPr lang="en-US" smtClean="0"/>
+              <a:rPr lang="en-US"/>
               <a:t>Edit Master text styles</a:t>
             </a:r>
           </a:p>
           <a:p>
             <a:pPr lvl="1"/>
             <a:r>
-              <a:rPr lang="en-US" smtClean="0"/>
+              <a:rPr lang="en-US"/>
               <a:t>Second level</a:t>
             </a:r>
           </a:p>
           <a:p>
             <a:pPr lvl="2"/>
             <a:r>
-              <a:rPr lang="en-US" smtClean="0"/>
+              <a:rPr lang="en-US"/>
               <a:t>Third level</a:t>
             </a:r>
           </a:p>
           <a:p>
             <a:pPr lvl="3"/>
             <a:r>
-              <a:rPr lang="en-US" smtClean="0"/>
+              <a:rPr lang="en-US"/>
               <a:t>Fourth level</a:t>
             </a:r>
           </a:p>
           <a:p>
             <a:pPr lvl="4"/>
             <a:r>
-              <a:rPr lang="en-US" smtClean="0"/>
+              <a:rPr lang="en-US"/>
               <a:t>Fifth level</a:t>
             </a:r>
             <a:endParaRPr lang="en-US" dirty="0"/>
@@ -5774,7 +5773,7 @@
           <a:p>
             <a:pPr lvl="0"/>
             <a:r>
-              <a:rPr lang="en-US" smtClean="0"/>
+              <a:rPr lang="en-US"/>
               <a:t>Edit Master text styles</a:t>
             </a:r>
           </a:p>
@@ -5797,7 +5796,7 @@
           <a:p>
             <a:fld id="{4509A250-FF31-4206-8172-F9D3106AACB1}" type="datetimeFigureOut">
               <a:rPr lang="en-US" smtClean="0"/>
-              <a:t>5/18/2020</a:t>
+              <a:t>3/8/2023</a:t>
             </a:fld>
             <a:endParaRPr lang="en-US" dirty="0"/>
           </a:p>
@@ -5900,7 +5899,7 @@
           </a:lstStyle>
           <a:p>
             <a:r>
-              <a:rPr lang="en-US" smtClean="0"/>
+              <a:rPr lang="en-US"/>
               <a:t>Click to edit Master title style</a:t>
             </a:r>
             <a:endParaRPr lang="en-US" dirty="0"/>
@@ -5965,7 +5964,7 @@
           </a:lstStyle>
           <a:p>
             <a:r>
-              <a:rPr lang="en-US" smtClean="0"/>
+              <a:rPr lang="en-US"/>
               <a:t>Click icon to add picture</a:t>
             </a:r>
             <a:endParaRPr lang="en-US" dirty="0"/>
@@ -6055,7 +6054,7 @@
           <a:p>
             <a:pPr lvl="0"/>
             <a:r>
-              <a:rPr lang="en-US" smtClean="0"/>
+              <a:rPr lang="en-US"/>
               <a:t>Edit Master text styles</a:t>
             </a:r>
           </a:p>
@@ -6078,7 +6077,7 @@
           <a:p>
             <a:fld id="{4509A250-FF31-4206-8172-F9D3106AACB1}" type="datetimeFigureOut">
               <a:rPr lang="en-US" smtClean="0"/>
-              <a:t>5/18/2020</a:t>
+              <a:t>3/8/2023</a:t>
             </a:fld>
             <a:endParaRPr lang="en-US" dirty="0"/>
           </a:p>
@@ -6196,7 +6195,7 @@
           <a:lstStyle/>
           <a:p>
             <a:r>
-              <a:rPr lang="en-US" smtClean="0"/>
+              <a:rPr lang="en-US"/>
               <a:t>Click to edit Master title style</a:t>
             </a:r>
             <a:endParaRPr lang="en-US" dirty="0"/>
@@ -6230,35 +6229,35 @@
           <a:p>
             <a:pPr lvl="0"/>
             <a:r>
-              <a:rPr lang="en-US" smtClean="0"/>
+              <a:rPr lang="en-US"/>
               <a:t>Edit Master text styles</a:t>
             </a:r>
           </a:p>
           <a:p>
             <a:pPr lvl="1"/>
             <a:r>
-              <a:rPr lang="en-US" smtClean="0"/>
+              <a:rPr lang="en-US"/>
               <a:t>Second level</a:t>
             </a:r>
           </a:p>
           <a:p>
             <a:pPr lvl="2"/>
             <a:r>
-              <a:rPr lang="en-US" smtClean="0"/>
+              <a:rPr lang="en-US"/>
               <a:t>Third level</a:t>
             </a:r>
           </a:p>
           <a:p>
             <a:pPr lvl="3"/>
             <a:r>
-              <a:rPr lang="en-US" smtClean="0"/>
+              <a:rPr lang="en-US"/>
               <a:t>Fourth level</a:t>
             </a:r>
           </a:p>
           <a:p>
             <a:pPr lvl="4"/>
             <a:r>
-              <a:rPr lang="en-US" smtClean="0"/>
+              <a:rPr lang="en-US"/>
               <a:t>Fifth level</a:t>
             </a:r>
             <a:endParaRPr lang="en-US" dirty="0"/>
@@ -6318,7 +6317,7 @@
           <a:p>
             <a:fld id="{4AAD347D-5ACD-4C99-B74B-A9C85AD731AF}" type="datetimeFigureOut">
               <a:rPr lang="en-US" smtClean="0"/>
-              <a:t>5/18/2020</a:t>
+              <a:t>3/8/2023</a:t>
             </a:fld>
             <a:endParaRPr lang="en-US" dirty="0"/>
           </a:p>
@@ -6911,10 +6910,9 @@
           <a:p>
             <a:pPr algn="ctr"/>
             <a:r>
-              <a:rPr lang="en-US" b="1" dirty="0" smtClean="0"/>
+              <a:rPr lang="en-US" b="1" dirty="0"/>
               <a:t>HPCC Systems</a:t>
             </a:r>
-            <a:endParaRPr lang="en-US" b="1" dirty="0"/>
           </a:p>
         </p:txBody>
       </p:sp>
@@ -6948,10 +6946,9 @@
           <a:p>
             <a:pPr algn="ctr"/>
             <a:r>
-              <a:rPr lang="en-US" dirty="0" smtClean="0"/>
+              <a:rPr lang="en-US" dirty="0"/>
               <a:t>An introduction</a:t>
             </a:r>
-            <a:endParaRPr lang="en-US" dirty="0"/>
           </a:p>
         </p:txBody>
       </p:sp>
@@ -6979,7 +6976,7 @@
           <a:p>
             <a:pPr algn="ctr"/>
             <a:r>
-              <a:rPr lang="en-US" dirty="0" smtClean="0">
+              <a:rPr lang="en-US" dirty="0">
                 <a:solidFill>
                   <a:schemeClr val="tx1">
                     <a:lumMod val="65000"/>
@@ -6993,7 +6990,7 @@
           <a:p>
             <a:pPr algn="ctr"/>
             <a:r>
-              <a:rPr lang="en-US" dirty="0" smtClean="0">
+              <a:rPr lang="en-US" dirty="0">
                 <a:solidFill>
                   <a:schemeClr val="tx1">
                     <a:lumMod val="65000"/>
@@ -7040,13 +7037,6 @@
   <p:clrMapOvr>
     <a:masterClrMapping/>
   </p:clrMapOvr>
-  <p:timing>
-    <p:tnLst>
-      <p:par>
-        <p:cTn id="1" dur="indefinite" restart="never" nodeType="tmRoot"/>
-      </p:par>
-    </p:tnLst>
-  </p:timing>
 </p:sld>
 </file>
 
@@ -7421,13 +7411,6 @@
   <p:clrMapOvr>
     <a:masterClrMapping/>
   </p:clrMapOvr>
-  <p:timing>
-    <p:tnLst>
-      <p:par>
-        <p:cTn id="1" dur="indefinite" restart="never" nodeType="tmRoot"/>
-      </p:par>
-    </p:tnLst>
-  </p:timing>
 </p:sld>
 </file>
 
@@ -7502,45 +7485,21 @@
             </a:pPr>
             <a:r>
               <a:rPr lang="en-US" dirty="0"/>
-              <a:t>ECL is </a:t>
-            </a:r>
-            <a:r>
-              <a:rPr lang="en-US" dirty="0" smtClean="0"/>
-              <a:t>a language </a:t>
-            </a:r>
-            <a:r>
-              <a:rPr lang="en-US" dirty="0"/>
-              <a:t>design to query/manipulate </a:t>
-            </a:r>
-            <a:r>
-              <a:rPr lang="en-US" dirty="0" smtClean="0"/>
-              <a:t>massive </a:t>
-            </a:r>
-            <a:r>
-              <a:rPr lang="en-US" dirty="0"/>
-              <a:t>data and is used for ETL (Extract, Transform, </a:t>
-            </a:r>
-            <a:r>
-              <a:rPr lang="en-US" dirty="0" smtClean="0"/>
-              <a:t>Load</a:t>
-            </a:r>
-            <a:r>
-              <a:rPr lang="en-US" dirty="0"/>
-              <a:t>) and data visualization.</a:t>
+              <a:t>ECL is a language design to query/manipulate massive data and is used for ETL (Extract, Transform, Load) and data visualization.</a:t>
             </a:r>
           </a:p>
           <a:p>
             <a:pPr marL="0" indent="0">
               <a:buNone/>
             </a:pPr>
-            <a:endParaRPr lang="en-US" dirty="0" smtClean="0"/>
+            <a:endParaRPr lang="en-US" dirty="0"/>
           </a:p>
           <a:p>
             <a:pPr marL="0" indent="0">
               <a:buNone/>
             </a:pPr>
             <a:r>
-              <a:rPr lang="en-US" b="1" dirty="0" smtClean="0"/>
+              <a:rPr lang="en-US" b="1" dirty="0"/>
               <a:t>Extract</a:t>
             </a:r>
           </a:p>
@@ -7549,7 +7508,7 @@
               <a:buNone/>
             </a:pPr>
             <a:r>
-              <a:rPr lang="en-US" sz="2600" dirty="0" smtClean="0"/>
+              <a:rPr lang="en-US" sz="2600" dirty="0"/>
               <a:t>Reading data from different type of datasets</a:t>
             </a:r>
           </a:p>
@@ -7564,7 +7523,7 @@
               <a:buNone/>
             </a:pPr>
             <a:r>
-              <a:rPr lang="en-US" b="1" dirty="0" smtClean="0"/>
+              <a:rPr lang="en-US" b="1" dirty="0"/>
               <a:t>Transform</a:t>
             </a:r>
           </a:p>
@@ -7573,7 +7532,7 @@
               <a:buNone/>
             </a:pPr>
             <a:r>
-              <a:rPr lang="en-US" sz="2600" dirty="0" smtClean="0"/>
+              <a:rPr lang="en-US" sz="2600" dirty="0"/>
               <a:t>Formatting/converting data to needed shape, so it can be used</a:t>
             </a:r>
           </a:p>
@@ -7588,7 +7547,7 @@
               <a:buNone/>
             </a:pPr>
             <a:r>
-              <a:rPr lang="en-US" b="1" dirty="0" smtClean="0"/>
+              <a:rPr lang="en-US" b="1" dirty="0"/>
               <a:t>Load</a:t>
             </a:r>
           </a:p>
@@ -7597,10 +7556,9 @@
               <a:buNone/>
             </a:pPr>
             <a:r>
-              <a:rPr lang="en-US" sz="2600" dirty="0" smtClean="0"/>
+              <a:rPr lang="en-US" sz="2600" dirty="0"/>
               <a:t>Writing dataset to it’s target location</a:t>
             </a:r>
-            <a:endParaRPr lang="en-US" sz="2600" dirty="0"/>
           </a:p>
         </p:txBody>
       </p:sp>
@@ -7885,18 +7843,13 @@
               <a:lstStyle/>
               <a:p>
                 <a:r>
-                  <a:rPr lang="en-US" dirty="0" smtClean="0">
+                  <a:rPr lang="en-US" dirty="0">
                     <a:solidFill>
                       <a:schemeClr val="bg1"/>
                     </a:solidFill>
                   </a:rPr>
                   <a:t>Source</a:t>
                 </a:r>
-                <a:endParaRPr lang="en-US" dirty="0">
-                  <a:solidFill>
-                    <a:schemeClr val="bg1"/>
-                  </a:solidFill>
-                </a:endParaRPr>
               </a:p>
             </p:txBody>
           </p:sp>
@@ -8211,18 +8164,13 @@
             <a:lstStyle/>
             <a:p>
               <a:r>
-                <a:rPr lang="en-US" dirty="0" smtClean="0">
+                <a:rPr lang="en-US" dirty="0">
                   <a:solidFill>
                     <a:schemeClr val="bg1"/>
                   </a:solidFill>
                 </a:rPr>
                 <a:t>Extract</a:t>
               </a:r>
-              <a:endParaRPr lang="en-US" dirty="0">
-                <a:solidFill>
-                  <a:schemeClr val="bg1"/>
-                </a:solidFill>
-              </a:endParaRPr>
             </a:p>
           </p:txBody>
         </p:sp>
@@ -8286,18 +8234,13 @@
             <a:lstStyle/>
             <a:p>
               <a:r>
-                <a:rPr lang="en-US" dirty="0" smtClean="0">
+                <a:rPr lang="en-US" dirty="0">
                   <a:solidFill>
                     <a:schemeClr val="bg1"/>
                   </a:solidFill>
                 </a:rPr>
                 <a:t>Transfer</a:t>
               </a:r>
-              <a:endParaRPr lang="en-US" dirty="0">
-                <a:solidFill>
-                  <a:schemeClr val="bg1"/>
-                </a:solidFill>
-              </a:endParaRPr>
             </a:p>
           </p:txBody>
         </p:sp>
@@ -8361,18 +8304,13 @@
             <a:lstStyle/>
             <a:p>
               <a:r>
-                <a:rPr lang="en-US" dirty="0" smtClean="0">
+                <a:rPr lang="en-US" dirty="0">
                   <a:solidFill>
                     <a:schemeClr val="bg1"/>
                   </a:solidFill>
                 </a:rPr>
                 <a:t>Load</a:t>
               </a:r>
-              <a:endParaRPr lang="en-US" dirty="0">
-                <a:solidFill>
-                  <a:schemeClr val="bg1"/>
-                </a:solidFill>
-              </a:endParaRPr>
             </a:p>
           </p:txBody>
         </p:sp>
@@ -8634,18 +8572,13 @@
               <a:lstStyle/>
               <a:p>
                 <a:r>
-                  <a:rPr lang="en-US" dirty="0" smtClean="0">
+                  <a:rPr lang="en-US" dirty="0">
                     <a:solidFill>
                       <a:schemeClr val="bg1"/>
                     </a:solidFill>
                   </a:rPr>
                   <a:t>Destination</a:t>
                 </a:r>
-                <a:endParaRPr lang="en-US" dirty="0">
-                  <a:solidFill>
-                    <a:schemeClr val="bg1"/>
-                  </a:solidFill>
-                </a:endParaRPr>
               </a:p>
             </p:txBody>
           </p:sp>
@@ -8661,13 +8594,6 @@
   <p:clrMapOvr>
     <a:masterClrMapping/>
   </p:clrMapOvr>
-  <p:timing>
-    <p:tnLst>
-      <p:par>
-        <p:cTn id="1" dur="indefinite" restart="never" nodeType="tmRoot"/>
-      </p:par>
-    </p:tnLst>
-  </p:timing>
 </p:sld>
 </file>
 
@@ -8736,7 +8662,7 @@
           <a:p>
             <a:pPr algn="ctr"/>
             <a:r>
-              <a:rPr lang="en-US" sz="7200" b="1" dirty="0" smtClean="0">
+              <a:rPr lang="en-US" sz="7200" b="1" dirty="0">
                 <a:solidFill>
                   <a:schemeClr val="tx1"/>
                 </a:solidFill>
@@ -8751,7 +8677,7 @@
               <a:t>ECL</a:t>
             </a:r>
             <a:br>
-              <a:rPr lang="en-US" sz="7200" b="1" dirty="0" smtClean="0">
+              <a:rPr lang="en-US" sz="7200" b="1" dirty="0">
                 <a:solidFill>
                   <a:schemeClr val="tx1"/>
                 </a:solidFill>
@@ -8765,7 +8691,7 @@
               </a:rPr>
             </a:br>
             <a:r>
-              <a:rPr lang="en-US" sz="7200" b="1" dirty="0" smtClean="0">
+              <a:rPr lang="en-US" sz="7200" b="1" dirty="0">
                 <a:solidFill>
                   <a:schemeClr val="tx1"/>
                 </a:solidFill>
@@ -8780,7 +8706,7 @@
               <a:t> </a:t>
             </a:r>
             <a:br>
-              <a:rPr lang="en-US" sz="7200" b="1" dirty="0" smtClean="0">
+              <a:rPr lang="en-US" sz="7200" b="1" dirty="0">
                 <a:solidFill>
                   <a:schemeClr val="tx1"/>
                 </a:solidFill>
@@ -8794,7 +8720,7 @@
               </a:rPr>
             </a:br>
             <a:r>
-              <a:rPr lang="en-US" sz="7200" b="1" dirty="0" smtClean="0">
+              <a:rPr lang="en-US" sz="7200" b="1" dirty="0">
                 <a:solidFill>
                   <a:schemeClr val="tx1"/>
                 </a:solidFill>
@@ -8808,18 +8734,6 @@
               </a:rPr>
               <a:t>SYNTAX</a:t>
             </a:r>
-            <a:endParaRPr lang="en-US" sz="7200" b="1" dirty="0">
-              <a:solidFill>
-                <a:schemeClr val="tx1"/>
-              </a:solidFill>
-              <a:effectLst>
-                <a:outerShdw blurRad="38100" dist="38100" dir="2700000" algn="tl">
-                  <a:srgbClr val="000000">
-                    <a:alpha val="43137"/>
-                  </a:srgbClr>
-                </a:outerShdw>
-              </a:effectLst>
-            </a:endParaRPr>
           </a:p>
         </p:txBody>
       </p:sp>
@@ -8833,13 +8747,6 @@
   <p:clrMapOvr>
     <a:masterClrMapping/>
   </p:clrMapOvr>
-  <p:timing>
-    <p:tnLst>
-      <p:par>
-        <p:cTn id="1" dur="indefinite" restart="never" nodeType="tmRoot"/>
-      </p:par>
-    </p:tnLst>
-  </p:timing>
 </p:sld>
 </file>
 
@@ -8881,10 +8788,9 @@
           <a:lstStyle/>
           <a:p>
             <a:r>
-              <a:rPr lang="en-US" b="1" dirty="0" smtClean="0"/>
+              <a:rPr lang="en-US" b="1" dirty="0"/>
               <a:t>House Keeping </a:t>
             </a:r>
-            <a:endParaRPr lang="en-US" b="1" dirty="0"/>
           </a:p>
         </p:txBody>
       </p:sp>
@@ -8912,74 +8818,58 @@
           <a:p>
             <a:pPr lvl="1"/>
             <a:r>
-              <a:rPr lang="en-US" sz="2800" b="1" dirty="0" smtClean="0"/>
+              <a:rPr lang="en-US" sz="2800" b="1" dirty="0"/>
               <a:t>Not</a:t>
             </a:r>
             <a:r>
-              <a:rPr lang="en-US" sz="2800" dirty="0" smtClean="0"/>
+              <a:rPr lang="en-US" sz="2800" dirty="0"/>
               <a:t> case-sensitive</a:t>
             </a:r>
-            <a:endParaRPr lang="en-US" sz="2800" dirty="0"/>
           </a:p>
           <a:p>
             <a:pPr lvl="1"/>
             <a:r>
               <a:rPr lang="en-US" sz="2800" dirty="0"/>
-              <a:t>White space is </a:t>
-            </a:r>
-            <a:r>
-              <a:rPr lang="en-US" sz="2800" dirty="0" smtClean="0"/>
-              <a:t>ignored</a:t>
+              <a:t>White space is ignored</a:t>
             </a:r>
           </a:p>
           <a:p>
             <a:pPr lvl="1"/>
             <a:r>
-              <a:rPr lang="en-US" sz="2800" dirty="0" smtClean="0"/>
+              <a:rPr lang="en-US" sz="2800" dirty="0"/>
               <a:t>Formatting is recommended</a:t>
             </a:r>
-            <a:endParaRPr lang="en-US" sz="2800" dirty="0"/>
           </a:p>
           <a:p>
             <a:pPr lvl="1"/>
             <a:r>
-              <a:rPr lang="en-US" sz="2800" dirty="0" smtClean="0"/>
+              <a:rPr lang="en-US" sz="2800" dirty="0"/>
               <a:t> </a:t>
             </a:r>
             <a:r>
-              <a:rPr lang="en-US" sz="2800" dirty="0" smtClean="0">
+              <a:rPr lang="en-US" sz="2800" dirty="0">
                 <a:solidFill>
                   <a:srgbClr val="00B050"/>
                 </a:solidFill>
               </a:rPr>
               <a:t>// This is a single line comment</a:t>
             </a:r>
-            <a:endParaRPr lang="en-US" sz="2800" dirty="0">
-              <a:solidFill>
-                <a:srgbClr val="00B050"/>
-              </a:solidFill>
-            </a:endParaRPr>
           </a:p>
           <a:p>
             <a:pPr lvl="1"/>
             <a:r>
-              <a:rPr lang="en-US" sz="2800" dirty="0" smtClean="0">
+              <a:rPr lang="en-US" sz="2800" dirty="0">
                 <a:solidFill>
                   <a:srgbClr val="00B050"/>
                 </a:solidFill>
               </a:rPr>
               <a:t>/* A  block comment */</a:t>
             </a:r>
-            <a:endParaRPr lang="en-US" sz="2800" dirty="0">
-              <a:solidFill>
-                <a:srgbClr val="00B050"/>
-              </a:solidFill>
-            </a:endParaRPr>
           </a:p>
           <a:p>
             <a:pPr lvl="1"/>
             <a:r>
-              <a:rPr lang="en-US" sz="2800" dirty="0" smtClean="0">
+              <a:rPr lang="en-US" sz="2800" dirty="0">
                 <a:solidFill>
                   <a:srgbClr val="FFC000"/>
                 </a:solidFill>
@@ -8987,39 +8877,14 @@
               <a:t>Object.Property</a:t>
             </a:r>
             <a:r>
-              <a:rPr lang="en-US" sz="2800" dirty="0" smtClean="0"/>
-              <a:t> </a:t>
+              <a:rPr lang="en-US" sz="2800" dirty="0"/>
+              <a:t> syntax  is used to qualify definition scope and disambiguate field references within datasets:</a:t>
             </a:r>
-            <a:r>
-              <a:rPr lang="en-US" sz="2800" dirty="0"/>
-              <a:t>syntax </a:t>
-            </a:r>
-            <a:r>
-              <a:rPr lang="en-US" sz="2800" dirty="0" smtClean="0"/>
-              <a:t> is used to </a:t>
-            </a:r>
-            <a:r>
-              <a:rPr lang="en-US" sz="2800" dirty="0"/>
-              <a:t>qualify </a:t>
-            </a:r>
-            <a:r>
-              <a:rPr lang="en-US" sz="2800" dirty="0" smtClean="0"/>
-              <a:t>definition </a:t>
-            </a:r>
-            <a:r>
-              <a:rPr lang="en-US" sz="2800" dirty="0"/>
-              <a:t>scope and disambiguate field references within </a:t>
-            </a:r>
-            <a:r>
-              <a:rPr lang="en-US" sz="2800" dirty="0" smtClean="0"/>
-              <a:t>datasets:</a:t>
-            </a:r>
-            <a:endParaRPr lang="en-US" sz="2800" dirty="0"/>
           </a:p>
           <a:p>
             <a:pPr lvl="2"/>
             <a:r>
-              <a:rPr lang="en-US" sz="2800" dirty="0" smtClean="0">
+              <a:rPr lang="en-US" sz="2800" dirty="0">
                 <a:solidFill>
                   <a:srgbClr val="FFC000"/>
                 </a:solidFill>
@@ -9027,20 +8892,12 @@
               <a:t>ModuleName.Definition  </a:t>
             </a:r>
             <a:r>
-              <a:rPr lang="en-US" sz="2400" dirty="0" smtClean="0">
-                <a:solidFill>
-                  <a:srgbClr val="00B050"/>
-                </a:solidFill>
-              </a:rPr>
-              <a:t>//</a:t>
-            </a:r>
-            <a:r>
               <a:rPr lang="en-US" sz="2400" dirty="0">
                 <a:solidFill>
                   <a:srgbClr val="00B050"/>
                 </a:solidFill>
               </a:rPr>
-              <a:t>reference a definition from another module/folder</a:t>
+              <a:t>//reference a definition from another module/folder</a:t>
             </a:r>
           </a:p>
           <a:p>
@@ -9055,19 +8912,7 @@
             </a:r>
             <a:r>
               <a:rPr lang="en-US" sz="2800" dirty="0"/>
-              <a:t> </a:t>
-            </a:r>
-            <a:r>
-              <a:rPr lang="en-US" sz="2800" dirty="0" smtClean="0"/>
-              <a:t>    </a:t>
-            </a:r>
-            <a:r>
-              <a:rPr lang="en-US" sz="2400" dirty="0" smtClean="0">
-                <a:solidFill>
-                  <a:srgbClr val="00B050"/>
-                </a:solidFill>
-              </a:rPr>
-              <a:t>//</a:t>
+              <a:t>     </a:t>
             </a:r>
             <a:r>
               <a:rPr lang="en-US" sz="2400" dirty="0">
@@ -9075,21 +8920,8 @@
                   <a:srgbClr val="00B050"/>
                 </a:solidFill>
               </a:rPr>
-              <a:t>reference a field in a dataset or </a:t>
+              <a:t>//reference a field in a dataset or record set</a:t>
             </a:r>
-            <a:r>
-              <a:rPr lang="en-US" sz="2400" dirty="0" smtClean="0">
-                <a:solidFill>
-                  <a:srgbClr val="00B050"/>
-                </a:solidFill>
-              </a:rPr>
-              <a:t>record set</a:t>
-            </a:r>
-            <a:endParaRPr lang="en-US" sz="2400" dirty="0">
-              <a:solidFill>
-                <a:srgbClr val="00B050"/>
-              </a:solidFill>
-            </a:endParaRPr>
           </a:p>
         </p:txBody>
       </p:sp>
@@ -9103,13 +8935,6 @@
   <p:clrMapOvr>
     <a:masterClrMapping/>
   </p:clrMapOvr>
-  <p:timing>
-    <p:tnLst>
-      <p:par>
-        <p:cTn id="1" dur="indefinite" restart="never" nodeType="tmRoot"/>
-      </p:par>
-    </p:tnLst>
-  </p:timing>
 </p:sld>
 </file>
 
@@ -9178,39 +9003,9 @@
                 <a:latin typeface="Calibri" panose="020F0502020204030204" pitchFamily="34" charset="0"/>
                 <a:cs typeface="Calibri" panose="020F0502020204030204" pitchFamily="34" charset="0"/>
               </a:rPr>
-              <a:t>Defines the layout </a:t>
+              <a:t>Defines the layout of fields in the dataset, order of the fields should be the same as the dataset.</a:t>
             </a:r>
-            <a:r>
-              <a:rPr lang="en-US" dirty="0" smtClean="0">
-                <a:solidFill>
-                  <a:schemeClr val="tx1"/>
-                </a:solidFill>
-                <a:latin typeface="Calibri" panose="020F0502020204030204" pitchFamily="34" charset="0"/>
-                <a:cs typeface="Calibri" panose="020F0502020204030204" pitchFamily="34" charset="0"/>
-              </a:rPr>
-              <a:t>of </a:t>
-            </a:r>
-            <a:r>
-              <a:rPr lang="en-US" dirty="0">
-                <a:solidFill>
-                  <a:schemeClr val="tx1"/>
-                </a:solidFill>
-                <a:latin typeface="Calibri" panose="020F0502020204030204" pitchFamily="34" charset="0"/>
-                <a:cs typeface="Calibri" panose="020F0502020204030204" pitchFamily="34" charset="0"/>
-              </a:rPr>
-              <a:t>fields in the dataset, order of the fields should be the same as the dataset</a:t>
-            </a:r>
-            <a:r>
-              <a:rPr lang="en-US" dirty="0" smtClean="0">
-                <a:solidFill>
-                  <a:schemeClr val="tx1"/>
-                </a:solidFill>
-                <a:latin typeface="Calibri" panose="020F0502020204030204" pitchFamily="34" charset="0"/>
-                <a:cs typeface="Calibri" panose="020F0502020204030204" pitchFamily="34" charset="0"/>
-              </a:rPr>
-              <a:t>.</a:t>
-            </a:r>
-            <a:endParaRPr lang="en-US" sz="2400" dirty="0" smtClean="0">
+            <a:endParaRPr lang="en-US" sz="2400" dirty="0">
               <a:solidFill>
                 <a:schemeClr val="tx1"/>
               </a:solidFill>
@@ -9222,7 +9017,7 @@
             <a:pPr marL="0" indent="0">
               <a:buNone/>
             </a:pPr>
-            <a:endParaRPr lang="en-US" sz="2400" dirty="0" smtClean="0">
+            <a:endParaRPr lang="en-US" sz="2400" dirty="0">
               <a:solidFill>
                 <a:schemeClr val="tx1"/>
               </a:solidFill>
@@ -9234,16 +9029,6 @@
             <a:pPr marL="0" indent="0">
               <a:buNone/>
             </a:pPr>
-            <a:r>
-              <a:rPr lang="en-US" b="1" dirty="0" smtClean="0">
-                <a:solidFill>
-                  <a:srgbClr val="FF0000"/>
-                </a:solidFill>
-                <a:latin typeface="Calibri" panose="020F0502020204030204" pitchFamily="34" charset="0"/>
-                <a:cs typeface="Calibri" panose="020F0502020204030204" pitchFamily="34" charset="0"/>
-              </a:rPr>
-              <a:t>File </a:t>
-            </a:r>
             <a:r>
               <a:rPr lang="en-US" b="1" dirty="0">
                 <a:solidFill>
@@ -9252,7 +9037,7 @@
                 <a:latin typeface="Calibri" panose="020F0502020204030204" pitchFamily="34" charset="0"/>
                 <a:cs typeface="Calibri" panose="020F0502020204030204" pitchFamily="34" charset="0"/>
               </a:rPr>
-              <a:t>Dataset</a:t>
+              <a:t>File Dataset</a:t>
             </a:r>
           </a:p>
           <a:p>
@@ -9330,13 +9115,6 @@
   <p:clrMapOvr>
     <a:masterClrMapping/>
   </p:clrMapOvr>
-  <p:timing>
-    <p:tnLst>
-      <p:par>
-        <p:cTn id="1" dur="indefinite" restart="never" nodeType="tmRoot"/>
-      </p:par>
-    </p:tnLst>
-  </p:timing>
 </p:sld>
 </file>
 
@@ -9380,29 +9158,25 @@
           <a:lstStyle/>
           <a:p>
             <a:r>
-              <a:rPr lang="en-US" sz="4000" dirty="0" smtClean="0">
+              <a:rPr lang="en-US" sz="4000" dirty="0">
                 <a:latin typeface="Calibri" panose="020F0502020204030204" pitchFamily="34" charset="0"/>
                 <a:cs typeface="Calibri" panose="020F0502020204030204" pitchFamily="34" charset="0"/>
               </a:rPr>
               <a:t>Datasets </a:t>
             </a:r>
             <a:br>
-              <a:rPr lang="en-US" sz="4000" dirty="0" smtClean="0">
+              <a:rPr lang="en-US" sz="4000" dirty="0">
                 <a:latin typeface="Calibri" panose="020F0502020204030204" pitchFamily="34" charset="0"/>
                 <a:cs typeface="Calibri" panose="020F0502020204030204" pitchFamily="34" charset="0"/>
               </a:rPr>
             </a:br>
             <a:r>
-              <a:rPr lang="en-US" sz="4000" dirty="0" smtClean="0">
+              <a:rPr lang="en-US" sz="4000" dirty="0">
                 <a:latin typeface="Calibri" panose="020F0502020204030204" pitchFamily="34" charset="0"/>
                 <a:cs typeface="Calibri" panose="020F0502020204030204" pitchFamily="34" charset="0"/>
               </a:rPr>
               <a:t>Record Structure </a:t>
             </a:r>
-            <a:endParaRPr lang="en-US" sz="4000" dirty="0">
-              <a:latin typeface="Calibri" panose="020F0502020204030204" pitchFamily="34" charset="0"/>
-              <a:cs typeface="Calibri" panose="020F0502020204030204" pitchFamily="34" charset="0"/>
-            </a:endParaRPr>
           </a:p>
         </p:txBody>
       </p:sp>
@@ -9440,13 +9214,6 @@
   <p:clrMapOvr>
     <a:masterClrMapping/>
   </p:clrMapOvr>
-  <p:timing>
-    <p:tnLst>
-      <p:par>
-        <p:cTn id="1" dur="indefinite" restart="never" nodeType="tmRoot"/>
-      </p:par>
-    </p:tnLst>
-  </p:timing>
 </p:sld>
 </file>
 
@@ -9493,7 +9260,7 @@
               <a:buNone/>
             </a:pPr>
             <a:r>
-              <a:rPr lang="en-US" b="1" dirty="0" smtClean="0">
+              <a:rPr lang="en-US" b="1" dirty="0">
                 <a:solidFill>
                   <a:srgbClr val="FF0000"/>
                 </a:solidFill>
@@ -9502,20 +9269,13 @@
               </a:rPr>
               <a:t>OUTPUT</a:t>
             </a:r>
-            <a:endParaRPr lang="en-US" b="1" dirty="0">
-              <a:solidFill>
-                <a:srgbClr val="FF0000"/>
-              </a:solidFill>
-              <a:latin typeface="Calibri" panose="020F0502020204030204" pitchFamily="34" charset="0"/>
-              <a:cs typeface="Calibri" panose="020F0502020204030204" pitchFamily="34" charset="0"/>
-            </a:endParaRPr>
           </a:p>
           <a:p>
             <a:pPr marL="0" indent="0">
               <a:buNone/>
             </a:pPr>
             <a:r>
-              <a:rPr lang="en-US" dirty="0" smtClean="0">
+              <a:rPr lang="en-US" dirty="0">
                 <a:solidFill>
                   <a:schemeClr val="tx1"/>
                 </a:solidFill>
@@ -9529,7 +9289,7 @@
             <a:pPr marL="0" indent="0">
               <a:buNone/>
             </a:pPr>
-            <a:endParaRPr lang="en-US" dirty="0" smtClean="0">
+            <a:endParaRPr lang="en-US" dirty="0">
               <a:solidFill>
                 <a:schemeClr val="tx1"/>
               </a:solidFill>
@@ -9542,7 +9302,7 @@
               <a:buNone/>
             </a:pPr>
             <a:r>
-              <a:rPr lang="en-US" b="1" dirty="0" smtClean="0">
+              <a:rPr lang="en-US" b="1" dirty="0">
                 <a:solidFill>
                   <a:srgbClr val="FF0000"/>
                 </a:solidFill>
@@ -9551,38 +9311,17 @@
               </a:rPr>
               <a:t>CHOOSEN</a:t>
             </a:r>
-            <a:endParaRPr lang="en-US" b="1" dirty="0">
-              <a:solidFill>
-                <a:srgbClr val="FF0000"/>
-              </a:solidFill>
-              <a:latin typeface="Calibri" panose="020F0502020204030204" pitchFamily="34" charset="0"/>
-              <a:cs typeface="Calibri" panose="020F0502020204030204" pitchFamily="34" charset="0"/>
-            </a:endParaRPr>
           </a:p>
           <a:p>
             <a:pPr marL="0" indent="0">
               <a:buNone/>
             </a:pPr>
-            <a:r>
-              <a:rPr lang="en-US" dirty="0" smtClean="0">
-                <a:latin typeface="Calibri" panose="020F0502020204030204" pitchFamily="34" charset="0"/>
-                <a:cs typeface="Calibri" panose="020F0502020204030204" pitchFamily="34" charset="0"/>
-              </a:rPr>
-              <a:t>Returns </a:t>
-            </a:r>
             <a:r>
               <a:rPr lang="en-US" dirty="0">
                 <a:latin typeface="Calibri" panose="020F0502020204030204" pitchFamily="34" charset="0"/>
                 <a:cs typeface="Calibri" panose="020F0502020204030204" pitchFamily="34" charset="0"/>
               </a:rPr>
-              <a:t>the first n number of </a:t>
-            </a:r>
-            <a:r>
-              <a:rPr lang="en-US" dirty="0" smtClean="0">
-                <a:latin typeface="Calibri" panose="020F0502020204030204" pitchFamily="34" charset="0"/>
-                <a:cs typeface="Calibri" panose="020F0502020204030204" pitchFamily="34" charset="0"/>
-              </a:rPr>
-              <a:t>records.</a:t>
+              <a:t>Returns the first n number of records.</a:t>
             </a:r>
             <a:endParaRPr lang="en-US" dirty="0">
               <a:solidFill>
@@ -9790,13 +9529,6 @@
   <p:clrMapOvr>
     <a:masterClrMapping/>
   </p:clrMapOvr>
-  <p:timing>
-    <p:tnLst>
-      <p:par>
-        <p:cTn id="1" dur="indefinite" restart="never" nodeType="tmRoot"/>
-      </p:par>
-    </p:tnLst>
-  </p:timing>
 </p:sld>
 </file>
 
@@ -9843,7 +9575,7 @@
               <a:buNone/>
             </a:pPr>
             <a:r>
-              <a:rPr lang="en-US" b="1" dirty="0" smtClean="0">
+              <a:rPr lang="en-US" b="1" dirty="0">
                 <a:solidFill>
                   <a:srgbClr val="FF0000"/>
                 </a:solidFill>
@@ -9852,13 +9584,6 @@
               </a:rPr>
               <a:t>SORT</a:t>
             </a:r>
-            <a:endParaRPr lang="en-US" b="1" dirty="0">
-              <a:solidFill>
-                <a:srgbClr val="FF0000"/>
-              </a:solidFill>
-              <a:latin typeface="Calibri" panose="020F0502020204030204" pitchFamily="34" charset="0"/>
-              <a:cs typeface="Calibri" panose="020F0502020204030204" pitchFamily="34" charset="0"/>
-            </a:endParaRPr>
           </a:p>
           <a:p>
             <a:pPr marL="0" indent="0">
@@ -9883,7 +9608,7 @@
             <a:pPr marL="0" indent="0">
               <a:buNone/>
             </a:pPr>
-            <a:endParaRPr lang="en-US" dirty="0" smtClean="0">
+            <a:endParaRPr lang="en-US" dirty="0">
               <a:solidFill>
                 <a:schemeClr val="tx1"/>
               </a:solidFill>
@@ -9896,7 +9621,7 @@
               <a:buNone/>
             </a:pPr>
             <a:r>
-              <a:rPr lang="en-US" b="1" dirty="0" smtClean="0">
+              <a:rPr lang="en-US" b="1" dirty="0">
                 <a:solidFill>
                   <a:srgbClr val="FF0000"/>
                 </a:solidFill>
@@ -9905,20 +9630,13 @@
               </a:rPr>
               <a:t>FILTER</a:t>
             </a:r>
-            <a:endParaRPr lang="en-US" b="1" dirty="0">
-              <a:solidFill>
-                <a:srgbClr val="FF0000"/>
-              </a:solidFill>
-              <a:latin typeface="Calibri" panose="020F0502020204030204" pitchFamily="34" charset="0"/>
-              <a:cs typeface="Calibri" panose="020F0502020204030204" pitchFamily="34" charset="0"/>
-            </a:endParaRPr>
           </a:p>
           <a:p>
             <a:pPr marL="0" indent="0">
               <a:buNone/>
             </a:pPr>
             <a:r>
-              <a:rPr lang="en-US" dirty="0" smtClean="0">
+              <a:rPr lang="en-US" dirty="0">
                 <a:solidFill>
                   <a:schemeClr val="tx1"/>
                 </a:solidFill>
@@ -9927,13 +9645,6 @@
               </a:rPr>
               <a:t>Choosing a smaller part of dataset</a:t>
             </a:r>
-            <a:endParaRPr lang="en-US" dirty="0">
-              <a:solidFill>
-                <a:schemeClr val="tx1"/>
-              </a:solidFill>
-              <a:latin typeface="Calibri" panose="020F0502020204030204" pitchFamily="34" charset="0"/>
-              <a:cs typeface="Calibri" panose="020F0502020204030204" pitchFamily="34" charset="0"/>
-            </a:endParaRPr>
           </a:p>
         </p:txBody>
       </p:sp>
@@ -10123,13 +9834,6 @@
   <p:clrMapOvr>
     <a:masterClrMapping/>
   </p:clrMapOvr>
-  <p:timing>
-    <p:tnLst>
-      <p:par>
-        <p:cTn id="1" dur="indefinite" restart="never" nodeType="tmRoot"/>
-      </p:par>
-    </p:tnLst>
-  </p:timing>
 </p:sld>
 </file>
 
@@ -10176,7 +9880,7 @@
               <a:buNone/>
             </a:pPr>
             <a:r>
-              <a:rPr lang="en-US" b="1" dirty="0" smtClean="0">
+              <a:rPr lang="en-US" b="1" dirty="0">
                 <a:solidFill>
                   <a:srgbClr val="FF0000"/>
                 </a:solidFill>
@@ -10185,13 +9889,6 @@
               </a:rPr>
               <a:t>Math Functions</a:t>
             </a:r>
-            <a:endParaRPr lang="en-US" b="1" dirty="0">
-              <a:solidFill>
-                <a:srgbClr val="FF0000"/>
-              </a:solidFill>
-              <a:latin typeface="Calibri" panose="020F0502020204030204" pitchFamily="34" charset="0"/>
-              <a:cs typeface="Calibri" panose="020F0502020204030204" pitchFamily="34" charset="0"/>
-            </a:endParaRPr>
           </a:p>
         </p:txBody>
       </p:sp>
@@ -10253,13 +9950,6 @@
   <p:clrMapOvr>
     <a:masterClrMapping/>
   </p:clrMapOvr>
-  <p:timing>
-    <p:tnLst>
-      <p:par>
-        <p:cTn id="1" dur="indefinite" restart="never" nodeType="tmRoot"/>
-      </p:par>
-    </p:tnLst>
-  </p:timing>
 </p:sld>
 </file>
 
@@ -10306,7 +9996,7 @@
               <a:buNone/>
             </a:pPr>
             <a:r>
-              <a:rPr lang="en-US" sz="4000" b="1" dirty="0" smtClean="0">
+              <a:rPr lang="en-US" sz="4000" b="1" dirty="0">
                 <a:solidFill>
                   <a:srgbClr val="FF0000"/>
                 </a:solidFill>
@@ -10315,13 +10005,6 @@
               </a:rPr>
               <a:t>Correlation</a:t>
             </a:r>
-            <a:endParaRPr lang="en-US" sz="4000" b="1" dirty="0">
-              <a:solidFill>
-                <a:srgbClr val="FF0000"/>
-              </a:solidFill>
-              <a:latin typeface="Calibri" panose="020F0502020204030204" pitchFamily="34" charset="0"/>
-              <a:cs typeface="Calibri" panose="020F0502020204030204" pitchFamily="34" charset="0"/>
-            </a:endParaRPr>
           </a:p>
           <a:p>
             <a:pPr marL="0" indent="0">
@@ -10380,18 +10063,11 @@
                 <a:latin typeface="Calibri" panose="020F0502020204030204" pitchFamily="34" charset="0"/>
                 <a:cs typeface="Calibri" panose="020F0502020204030204" pitchFamily="34" charset="0"/>
               </a:rPr>
-              <a:t> Correlation</a:t>
+              <a:t> Correlation.</a:t>
             </a:r>
-            <a:r>
-              <a:rPr lang="en-US" sz="2400" dirty="0" smtClean="0">
-                <a:latin typeface="Calibri" panose="020F0502020204030204" pitchFamily="34" charset="0"/>
-                <a:cs typeface="Calibri" panose="020F0502020204030204" pitchFamily="34" charset="0"/>
-              </a:rPr>
-              <a:t>.</a:t>
-            </a:r>
-          </a:p>
-          <a:p>
-            <a:endParaRPr lang="en-US" sz="2400" dirty="0" smtClean="0">
+          </a:p>
+          <a:p>
+            <a:endParaRPr lang="en-US" sz="2400" dirty="0">
               <a:latin typeface="Calibri" panose="020F0502020204030204" pitchFamily="34" charset="0"/>
               <a:cs typeface="Calibri" panose="020F0502020204030204" pitchFamily="34" charset="0"/>
             </a:endParaRPr>
@@ -10420,14 +10096,7 @@
                 <a:latin typeface="Calibri" panose="020F0502020204030204" pitchFamily="34" charset="0"/>
                 <a:cs typeface="Calibri" panose="020F0502020204030204" pitchFamily="34" charset="0"/>
               </a:rPr>
-              <a:t>value</a:t>
-            </a:r>
-            <a:r>
-              <a:rPr lang="en-US" sz="2400" smtClean="0">
-                <a:latin typeface="Calibri" panose="020F0502020204030204" pitchFamily="34" charset="0"/>
-                <a:cs typeface="Calibri" panose="020F0502020204030204" pitchFamily="34" charset="0"/>
-              </a:rPr>
-              <a:t>:</a:t>
+              <a:t>value:</a:t>
             </a:r>
           </a:p>
           <a:p>
@@ -10446,21 +10115,7 @@
                 <a:latin typeface="Calibri" panose="020F0502020204030204" pitchFamily="34" charset="0"/>
                 <a:cs typeface="Calibri" panose="020F0502020204030204" pitchFamily="34" charset="0"/>
               </a:rPr>
-              <a:t>1 </a:t>
-            </a:r>
-            <a:r>
-              <a:rPr lang="en-US" sz="2400" dirty="0" smtClean="0">
-                <a:latin typeface="Calibri" panose="020F0502020204030204" pitchFamily="34" charset="0"/>
-                <a:cs typeface="Calibri" panose="020F0502020204030204" pitchFamily="34" charset="0"/>
-              </a:rPr>
-              <a:t>	is </a:t>
-            </a:r>
-            <a:r>
-              <a:rPr lang="en-US" sz="2400" dirty="0">
-                <a:latin typeface="Calibri" panose="020F0502020204030204" pitchFamily="34" charset="0"/>
-                <a:cs typeface="Calibri" panose="020F0502020204030204" pitchFamily="34" charset="0"/>
-              </a:rPr>
-              <a:t>a perfect positive correlation</a:t>
+              <a:t>1 	is a perfect positive correlation</a:t>
             </a:r>
           </a:p>
           <a:p>
@@ -10473,62 +10128,20 @@
                 <a:latin typeface="Calibri" panose="020F0502020204030204" pitchFamily="34" charset="0"/>
                 <a:cs typeface="Calibri" panose="020F0502020204030204" pitchFamily="34" charset="0"/>
               </a:rPr>
-              <a:t>0 </a:t>
+              <a:t>0 	is no correlation , no relationship between values</a:t>
             </a:r>
-            <a:r>
-              <a:rPr lang="en-US" sz="2400" dirty="0" smtClean="0">
-                <a:latin typeface="Calibri" panose="020F0502020204030204" pitchFamily="34" charset="0"/>
-                <a:cs typeface="Calibri" panose="020F0502020204030204" pitchFamily="34" charset="0"/>
-              </a:rPr>
-              <a:t>	is </a:t>
-            </a:r>
+          </a:p>
+          <a:p>
+            <a:pPr marL="342900" indent="-342900">
+              <a:buFont typeface="Arial" panose="020B0604020202020204" pitchFamily="34" charset="0"/>
+              <a:buChar char="•"/>
+            </a:pPr>
             <a:r>
               <a:rPr lang="en-US" sz="2400" dirty="0">
                 <a:latin typeface="Calibri" panose="020F0502020204030204" pitchFamily="34" charset="0"/>
                 <a:cs typeface="Calibri" panose="020F0502020204030204" pitchFamily="34" charset="0"/>
               </a:rPr>
-              <a:t>no correlation </a:t>
-            </a:r>
-            <a:r>
-              <a:rPr lang="en-US" sz="2400" dirty="0" smtClean="0">
-                <a:latin typeface="Calibri" panose="020F0502020204030204" pitchFamily="34" charset="0"/>
-                <a:cs typeface="Calibri" panose="020F0502020204030204" pitchFamily="34" charset="0"/>
-              </a:rPr>
-              <a:t>, no relationship between values</a:t>
-            </a:r>
-          </a:p>
-          <a:p>
-            <a:pPr marL="342900" indent="-342900">
-              <a:buFont typeface="Arial" panose="020B0604020202020204" pitchFamily="34" charset="0"/>
-              <a:buChar char="•"/>
-            </a:pPr>
-            <a:r>
-              <a:rPr lang="en-US" sz="2400" dirty="0" smtClean="0">
-                <a:latin typeface="Calibri" panose="020F0502020204030204" pitchFamily="34" charset="0"/>
-                <a:cs typeface="Calibri" panose="020F0502020204030204" pitchFamily="34" charset="0"/>
-              </a:rPr>
-              <a:t>-1</a:t>
-            </a:r>
-            <a:r>
-              <a:rPr lang="en-US" sz="2400" dirty="0">
-                <a:latin typeface="Calibri" panose="020F0502020204030204" pitchFamily="34" charset="0"/>
-                <a:cs typeface="Calibri" panose="020F0502020204030204" pitchFamily="34" charset="0"/>
-              </a:rPr>
-              <a:t> </a:t>
-            </a:r>
-            <a:r>
-              <a:rPr lang="en-US" sz="2400" dirty="0" smtClean="0">
-                <a:latin typeface="Calibri" panose="020F0502020204030204" pitchFamily="34" charset="0"/>
-                <a:cs typeface="Calibri" panose="020F0502020204030204" pitchFamily="34" charset="0"/>
-              </a:rPr>
-              <a:t>	is </a:t>
-            </a:r>
-            <a:r>
-              <a:rPr lang="en-US" sz="2400" dirty="0">
-                <a:latin typeface="Calibri" panose="020F0502020204030204" pitchFamily="34" charset="0"/>
-                <a:cs typeface="Calibri" panose="020F0502020204030204" pitchFamily="34" charset="0"/>
-              </a:rPr>
-              <a:t>a perfect negative correlation</a:t>
+              <a:t>-1 	is a perfect negative correlation</a:t>
             </a:r>
           </a:p>
           <a:p>
@@ -10603,7 +10216,7 @@
           <a:lstStyle/>
           <a:p>
             <a:r>
-              <a:rPr lang="en-US" dirty="0" smtClean="0">
+              <a:rPr lang="en-US" dirty="0">
                 <a:solidFill>
                   <a:schemeClr val="tx1"/>
                 </a:solidFill>
@@ -10612,13 +10225,6 @@
               </a:rPr>
               <a:t>HPCC</a:t>
             </a:r>
-            <a:endParaRPr lang="en-US" dirty="0">
-              <a:solidFill>
-                <a:schemeClr val="tx1"/>
-              </a:solidFill>
-              <a:latin typeface="Calibri" panose="020F0502020204030204" pitchFamily="34" charset="0"/>
-              <a:cs typeface="Calibri" panose="020F0502020204030204" pitchFamily="34" charset="0"/>
-            </a:endParaRPr>
           </a:p>
         </p:txBody>
       </p:sp>
@@ -10644,7 +10250,7 @@
           <a:lstStyle/>
           <a:p>
             <a:r>
-              <a:rPr lang="en-US" sz="2000" dirty="0" smtClean="0">
+              <a:rPr lang="en-US" sz="2000" dirty="0">
                 <a:latin typeface="Calibri" panose="020F0502020204030204" pitchFamily="34" charset="0"/>
                 <a:cs typeface="Calibri" panose="020F0502020204030204" pitchFamily="34" charset="0"/>
               </a:rPr>
@@ -10663,7 +10269,7 @@
               <a:buChar char="•"/>
             </a:pPr>
             <a:r>
-              <a:rPr lang="en-US" dirty="0" smtClean="0"/>
+              <a:rPr lang="en-US" dirty="0"/>
               <a:t>Open-source</a:t>
             </a:r>
           </a:p>
@@ -10673,14 +10279,9 @@
               <a:buChar char="•"/>
             </a:pPr>
             <a:r>
-              <a:rPr lang="en-US" dirty="0" smtClean="0"/>
-              <a:t>Data-intensive </a:t>
+              <a:rPr lang="en-US" dirty="0"/>
+              <a:t>Data-intensive supercomputing platform </a:t>
             </a:r>
-            <a:r>
-              <a:rPr lang="en-US" dirty="0"/>
-              <a:t>supercomputing platform </a:t>
-            </a:r>
-            <a:endParaRPr lang="en-US" dirty="0" smtClean="0"/>
           </a:p>
           <a:p>
             <a:pPr marL="285750" indent="-285750">
@@ -10688,16 +10289,8 @@
               <a:buChar char="•"/>
             </a:pPr>
             <a:r>
-              <a:rPr lang="en-US" dirty="0" smtClean="0"/>
-              <a:t>Solve enterprise level big </a:t>
-            </a:r>
-            <a:r>
               <a:rPr lang="en-US" dirty="0"/>
-              <a:t>data </a:t>
-            </a:r>
-            <a:r>
-              <a:rPr lang="en-US" dirty="0" smtClean="0"/>
-              <a:t>problems</a:t>
+              <a:t>Solve enterprise level big data problems</a:t>
             </a:r>
             <a:endParaRPr lang="en-US" sz="2000" dirty="0">
               <a:latin typeface="Calibri" panose="020F0502020204030204" pitchFamily="34" charset="0"/>
@@ -10774,7 +10367,7 @@
           </a:lstStyle>
           <a:p>
             <a:r>
-              <a:rPr lang="en-US" dirty="0" smtClean="0">
+              <a:rPr lang="en-US" dirty="0">
                 <a:solidFill>
                   <a:schemeClr val="tx1"/>
                 </a:solidFill>
@@ -10783,13 +10376,6 @@
               </a:rPr>
               <a:t>ECL</a:t>
             </a:r>
-            <a:endParaRPr lang="en-US" dirty="0">
-              <a:solidFill>
-                <a:schemeClr val="tx1"/>
-              </a:solidFill>
-              <a:latin typeface="Calibri" panose="020F0502020204030204" pitchFamily="34" charset="0"/>
-              <a:cs typeface="Calibri" panose="020F0502020204030204" pitchFamily="34" charset="0"/>
-            </a:endParaRPr>
           </a:p>
         </p:txBody>
       </p:sp>
@@ -10815,7 +10401,7 @@
           <a:lstStyle/>
           <a:p>
             <a:r>
-              <a:rPr lang="en-US" sz="2000" dirty="0" smtClean="0">
+              <a:rPr lang="en-US" sz="2000" dirty="0">
                 <a:latin typeface="Calibri" panose="020F0502020204030204" pitchFamily="34" charset="0"/>
                 <a:cs typeface="Calibri" panose="020F0502020204030204" pitchFamily="34" charset="0"/>
               </a:rPr>
@@ -10834,7 +10420,7 @@
               <a:buChar char="•"/>
             </a:pPr>
             <a:r>
-              <a:rPr lang="en-US" sz="2000" dirty="0" smtClean="0">
+              <a:rPr lang="en-US" sz="2000" dirty="0">
                 <a:latin typeface="Calibri" panose="020F0502020204030204" pitchFamily="34" charset="0"/>
                 <a:cs typeface="Calibri" panose="020F0502020204030204" pitchFamily="34" charset="0"/>
               </a:rPr>
@@ -10847,7 +10433,7 @@
               <a:buChar char="•"/>
             </a:pPr>
             <a:r>
-              <a:rPr lang="en-US" sz="2000" dirty="0" smtClean="0">
+              <a:rPr lang="en-US" sz="2000" dirty="0">
                 <a:latin typeface="Calibri" panose="020F0502020204030204" pitchFamily="34" charset="0"/>
                 <a:cs typeface="Calibri" panose="020F0502020204030204" pitchFamily="34" charset="0"/>
               </a:rPr>
@@ -10860,16 +10446,12 @@
               <a:buChar char="•"/>
             </a:pPr>
             <a:r>
-              <a:rPr lang="en-US" sz="2000" dirty="0" smtClean="0">
+              <a:rPr lang="en-US" sz="2000" dirty="0">
                 <a:latin typeface="Calibri" panose="020F0502020204030204" pitchFamily="34" charset="0"/>
                 <a:cs typeface="Calibri" panose="020F0502020204030204" pitchFamily="34" charset="0"/>
               </a:rPr>
               <a:t>Works with huge datasets </a:t>
             </a:r>
-            <a:endParaRPr lang="en-US" sz="2000" dirty="0">
-              <a:latin typeface="Calibri" panose="020F0502020204030204" pitchFamily="34" charset="0"/>
-              <a:cs typeface="Calibri" panose="020F0502020204030204" pitchFamily="34" charset="0"/>
-            </a:endParaRPr>
           </a:p>
         </p:txBody>
       </p:sp>
@@ -10929,13 +10511,6 @@
   <p:clrMapOvr>
     <a:masterClrMapping/>
   </p:clrMapOvr>
-  <p:timing>
-    <p:tnLst>
-      <p:par>
-        <p:cTn id="1" dur="indefinite" restart="never" nodeType="tmRoot"/>
-      </p:par>
-    </p:tnLst>
-  </p:timing>
 </p:sld>
 </file>
 
@@ -10982,7 +10557,7 @@
               <a:buNone/>
             </a:pPr>
             <a:r>
-              <a:rPr lang="en-US" sz="3600" b="1" dirty="0" smtClean="0">
+              <a:rPr lang="en-US" sz="3600" b="1" dirty="0">
                 <a:solidFill>
                   <a:srgbClr val="FF0000"/>
                 </a:solidFill>
@@ -10991,13 +10566,6 @@
               </a:rPr>
               <a:t>Correlation</a:t>
             </a:r>
-            <a:endParaRPr lang="en-US" sz="3600" b="1" dirty="0">
-              <a:solidFill>
-                <a:srgbClr val="FF0000"/>
-              </a:solidFill>
-              <a:latin typeface="Calibri" panose="020F0502020204030204" pitchFamily="34" charset="0"/>
-              <a:cs typeface="Calibri" panose="020F0502020204030204" pitchFamily="34" charset="0"/>
-            </a:endParaRPr>
           </a:p>
           <a:p>
             <a:pPr marL="0" indent="0">
@@ -11214,16 +10782,12 @@
           <a:lstStyle/>
           <a:p>
             <a:r>
-              <a:rPr lang="en-US" sz="2400" dirty="0" smtClean="0">
+              <a:rPr lang="en-US" sz="2400" dirty="0">
                 <a:latin typeface="Calibri" panose="020F0502020204030204" pitchFamily="34" charset="0"/>
                 <a:cs typeface="Calibri" panose="020F0502020204030204" pitchFamily="34" charset="0"/>
               </a:rPr>
               <a:t>Returns 1.0</a:t>
             </a:r>
-            <a:endParaRPr lang="en-US" sz="2400" dirty="0">
-              <a:latin typeface="Calibri" panose="020F0502020204030204" pitchFamily="34" charset="0"/>
-              <a:cs typeface="Calibri" panose="020F0502020204030204" pitchFamily="34" charset="0"/>
-            </a:endParaRPr>
           </a:p>
         </p:txBody>
       </p:sp>
@@ -11250,18 +10814,11 @@
           <a:lstStyle/>
           <a:p>
             <a:r>
-              <a:rPr lang="en-US" sz="2400" dirty="0" smtClean="0">
-                <a:latin typeface="Calibri" panose="020F0502020204030204" pitchFamily="34" charset="0"/>
-                <a:cs typeface="Calibri" panose="020F0502020204030204" pitchFamily="34" charset="0"/>
-              </a:rPr>
-              <a:t>Returns </a:t>
-            </a:r>
-            <a:r>
               <a:rPr lang="en-US" sz="2400" dirty="0">
                 <a:latin typeface="Calibri" panose="020F0502020204030204" pitchFamily="34" charset="0"/>
                 <a:cs typeface="Calibri" panose="020F0502020204030204" pitchFamily="34" charset="0"/>
               </a:rPr>
-              <a:t>0.4978702535543908</a:t>
+              <a:t>Returns 0.4978702535543908</a:t>
             </a:r>
           </a:p>
         </p:txBody>
@@ -11500,7 +11057,7 @@
               <a:buNone/>
             </a:pPr>
             <a:r>
-              <a:rPr lang="en-US" sz="3000" b="1" dirty="0" smtClean="0">
+              <a:rPr lang="en-US" sz="3000" b="1" dirty="0">
                 <a:solidFill>
                   <a:srgbClr val="FF0000"/>
                 </a:solidFill>
@@ -11509,13 +11066,6 @@
               </a:rPr>
               <a:t>MODULE</a:t>
             </a:r>
-            <a:endParaRPr lang="en-US" sz="3000" b="1" dirty="0">
-              <a:solidFill>
-                <a:srgbClr val="FF0000"/>
-              </a:solidFill>
-              <a:latin typeface="Calibri" panose="020F0502020204030204" pitchFamily="34" charset="0"/>
-              <a:cs typeface="Calibri" panose="020F0502020204030204" pitchFamily="34" charset="0"/>
-            </a:endParaRPr>
           </a:p>
           <a:p>
             <a:pPr marL="0" indent="0">
@@ -11562,12 +11112,8 @@
           </a:p>
           <a:p>
             <a:r>
-              <a:rPr lang="en-US" sz="2800" dirty="0" smtClean="0"/>
-              <a:t>Is a </a:t>
-            </a:r>
-            <a:r>
               <a:rPr lang="en-US" sz="2800" dirty="0"/>
-              <a:t>container that allows you to group related definitions. The </a:t>
+              <a:t>Is a container that allows you to group related definitions. The </a:t>
             </a:r>
             <a:r>
               <a:rPr lang="en-US" sz="2800" i="1" dirty="0"/>
@@ -11575,15 +11121,7 @@
             </a:r>
             <a:r>
               <a:rPr lang="en-US" sz="2800" dirty="0"/>
-              <a:t> passed to the </a:t>
-            </a:r>
-            <a:r>
-              <a:rPr lang="en-US" sz="2800" dirty="0" smtClean="0"/>
-              <a:t>module </a:t>
-            </a:r>
-            <a:r>
-              <a:rPr lang="en-US" sz="2800" dirty="0"/>
-              <a:t>are shared by all the related </a:t>
+              <a:t> passed to the module are shared by all the related </a:t>
             </a:r>
             <a:r>
               <a:rPr lang="en-US" sz="2800" i="1" dirty="0"/>
@@ -11604,21 +11142,8 @@
                   <a:srgbClr val="FF0000"/>
                 </a:solidFill>
               </a:rPr>
-              <a:t>Variable </a:t>
+              <a:t>Variable Scope</a:t>
             </a:r>
-            <a:r>
-              <a:rPr lang="en-US" sz="2800" dirty="0" smtClean="0">
-                <a:solidFill>
-                  <a:srgbClr val="FF0000"/>
-                </a:solidFill>
-              </a:rPr>
-              <a:t>Scope</a:t>
-            </a:r>
-            <a:endParaRPr lang="en-US" sz="2800" dirty="0">
-              <a:solidFill>
-                <a:srgbClr val="FF0000"/>
-              </a:solidFill>
-            </a:endParaRPr>
           </a:p>
           <a:p>
             <a:pPr marL="342900" indent="-342900">
@@ -11630,18 +11155,13 @@
               <a:t>Local definitions are visible only </a:t>
             </a:r>
             <a:r>
-              <a:rPr lang="en-US" sz="2800" u="sng" dirty="0" smtClean="0"/>
+              <a:rPr lang="en-US" sz="2800" u="sng" dirty="0"/>
               <a:t>up to </a:t>
             </a:r>
             <a:r>
-              <a:rPr lang="en-US" sz="2800" dirty="0" smtClean="0"/>
-              <a:t>an EXPORT </a:t>
+              <a:rPr lang="en-US" sz="2800" dirty="0"/>
+              <a:t>an EXPORT or SHARED </a:t>
             </a:r>
-            <a:r>
-              <a:rPr lang="en-US" sz="2800" dirty="0"/>
-              <a:t>or SHARED </a:t>
-            </a:r>
-            <a:endParaRPr lang="en-US" sz="2800" dirty="0" smtClean="0"/>
           </a:p>
           <a:p>
             <a:pPr marL="342900" indent="-342900">
@@ -11649,22 +11169,17 @@
               <a:buChar char="•"/>
             </a:pPr>
             <a:r>
-              <a:rPr lang="en-US" sz="2800" dirty="0" smtClean="0"/>
-              <a:t>SHARED </a:t>
+              <a:rPr lang="en-US" sz="2800" dirty="0"/>
+              <a:t>SHARED definitions are visible </a:t>
+            </a:r>
+            <a:r>
+              <a:rPr lang="en-US" sz="2800" u="sng" dirty="0"/>
+              <a:t>through</a:t>
             </a:r>
             <a:r>
               <a:rPr lang="en-US" sz="2800" dirty="0"/>
-              <a:t>definitions are visible </a:t>
-            </a:r>
-            <a:r>
-              <a:rPr lang="en-US" sz="2800" u="sng" dirty="0" smtClean="0"/>
-              <a:t>through</a:t>
-            </a:r>
-            <a:r>
-              <a:rPr lang="en-US" sz="2800" dirty="0" smtClean="0"/>
               <a:t> module.</a:t>
             </a:r>
-            <a:endParaRPr lang="en-US" sz="2800" dirty="0"/>
           </a:p>
           <a:p>
             <a:pPr marL="342900" indent="-342900">
@@ -11681,11 +11196,7 @@
             </a:r>
             <a:r>
               <a:rPr lang="en-US" sz="2800" dirty="0"/>
-              <a:t> </a:t>
-            </a:r>
-            <a:r>
-              <a:rPr lang="en-US" sz="2800" dirty="0" smtClean="0"/>
-              <a:t>and </a:t>
+              <a:t> and </a:t>
             </a:r>
             <a:r>
               <a:rPr lang="en-US" sz="2800" u="sng" dirty="0"/>
@@ -11693,15 +11204,7 @@
             </a:r>
             <a:r>
               <a:rPr lang="en-US" sz="2800" dirty="0"/>
-              <a:t> of  </a:t>
-            </a:r>
-            <a:r>
-              <a:rPr lang="en-US" sz="2800" dirty="0" smtClean="0"/>
-              <a:t>a module </a:t>
-            </a:r>
-            <a:r>
-              <a:rPr lang="en-US" sz="2800" dirty="0"/>
-              <a:t>.</a:t>
+              <a:t> of  a module .</a:t>
             </a:r>
           </a:p>
           <a:p>
@@ -11725,13 +11228,6 @@
   <p:clrMapOvr>
     <a:masterClrMapping/>
   </p:clrMapOvr>
-  <p:timing>
-    <p:tnLst>
-      <p:par>
-        <p:cTn id="1" dur="indefinite" restart="never" nodeType="tmRoot"/>
-      </p:par>
-    </p:tnLst>
-  </p:timing>
 </p:sld>
 </file>
 
@@ -11916,13 +11412,6 @@
   <p:clrMapOvr>
     <a:masterClrMapping/>
   </p:clrMapOvr>
-  <p:timing>
-    <p:tnLst>
-      <p:par>
-        <p:cTn id="1" dur="indefinite" restart="never" nodeType="tmRoot"/>
-      </p:par>
-    </p:tnLst>
-  </p:timing>
 </p:sld>
 </file>
 
@@ -11969,7 +11458,7 @@
               <a:buNone/>
             </a:pPr>
             <a:r>
-              <a:rPr lang="en-US" b="1" dirty="0" smtClean="0">
+              <a:rPr lang="en-US" b="1" dirty="0">
                 <a:solidFill>
                   <a:srgbClr val="FF0000"/>
                 </a:solidFill>
@@ -11978,19 +11467,12 @@
               </a:rPr>
               <a:t>TRANSFORM</a:t>
             </a:r>
-            <a:endParaRPr lang="en-US" b="1" dirty="0">
-              <a:solidFill>
-                <a:srgbClr val="FF0000"/>
-              </a:solidFill>
-              <a:latin typeface="Calibri" panose="020F0502020204030204" pitchFamily="34" charset="0"/>
-              <a:cs typeface="Calibri" panose="020F0502020204030204" pitchFamily="34" charset="0"/>
-            </a:endParaRPr>
           </a:p>
           <a:p>
             <a:pPr marL="0" indent="0">
               <a:buNone/>
             </a:pPr>
-            <a:endParaRPr lang="en-US" dirty="0" smtClean="0">
+            <a:endParaRPr lang="en-US" dirty="0">
               <a:solidFill>
                 <a:schemeClr val="tx1"/>
               </a:solidFill>
@@ -12433,7 +11915,7 @@
               <a:buNone/>
             </a:pPr>
             <a:r>
-              <a:rPr lang="en-US" b="1" dirty="0" smtClean="0">
+              <a:rPr lang="en-US" b="1" dirty="0">
                 <a:solidFill>
                   <a:srgbClr val="FF0000"/>
                 </a:solidFill>
@@ -12448,7 +11930,7 @@
               <a:buFont typeface="Arial" panose="020B0604020202020204" pitchFamily="34" charset="0"/>
               <a:buNone/>
             </a:pPr>
-            <a:endParaRPr lang="en-US" dirty="0" smtClean="0">
+            <a:endParaRPr lang="en-US" dirty="0">
               <a:solidFill>
                 <a:schemeClr val="tx1"/>
               </a:solidFill>
@@ -12535,13 +12017,6 @@
   <p:clrMapOvr>
     <a:masterClrMapping/>
   </p:clrMapOvr>
-  <p:timing>
-    <p:tnLst>
-      <p:par>
-        <p:cTn id="1" dur="indefinite" restart="never" nodeType="tmRoot"/>
-      </p:par>
-    </p:tnLst>
-  </p:timing>
 </p:sld>
 </file>
 
@@ -12622,7 +12097,7 @@
           <a:lstStyle/>
           <a:p>
             <a:r>
-              <a:rPr lang="en-US" dirty="0" err="1" smtClean="0">
+              <a:rPr lang="en-US" dirty="0" err="1">
                 <a:solidFill>
                   <a:schemeClr val="bg1">
                     <a:lumMod val="95000"/>
@@ -12635,7 +12110,7 @@
               <a:t>NameOutRec</a:t>
             </a:r>
             <a:r>
-              <a:rPr lang="en-US" dirty="0" smtClean="0">
+              <a:rPr lang="en-US" dirty="0">
                 <a:solidFill>
                   <a:schemeClr val="bg1">
                     <a:lumMod val="95000"/>
@@ -12649,7 +12124,7 @@
             </a:r>
           </a:p>
           <a:p>
-            <a:endParaRPr lang="en-US" dirty="0" smtClean="0">
+            <a:endParaRPr lang="en-US" dirty="0">
               <a:solidFill>
                 <a:schemeClr val="bg1">
                   <a:lumMod val="95000"/>
@@ -12662,7 +12137,7 @@
           </a:p>
           <a:p>
             <a:r>
-              <a:rPr lang="en-US" dirty="0" err="1" smtClean="0">
+              <a:rPr lang="en-US" dirty="0" err="1">
                 <a:solidFill>
                   <a:schemeClr val="bg1">
                     <a:lumMod val="95000"/>
@@ -12675,7 +12150,7 @@
               <a:t>CatThem</a:t>
             </a:r>
             <a:r>
-              <a:rPr lang="en-US" dirty="0" smtClean="0">
+              <a:rPr lang="en-US" dirty="0">
                 <a:solidFill>
                   <a:schemeClr val="bg1">
                     <a:lumMod val="95000"/>
@@ -12689,7 +12164,7 @@
             </a:r>
           </a:p>
           <a:p>
-            <a:endParaRPr lang="en-US" dirty="0" smtClean="0">
+            <a:endParaRPr lang="en-US" dirty="0">
               <a:solidFill>
                 <a:schemeClr val="bg1">
                   <a:lumMod val="95000"/>
@@ -12702,7 +12177,7 @@
           </a:p>
           <a:p>
             <a:r>
-              <a:rPr lang="en-US" dirty="0" err="1" smtClean="0">
+              <a:rPr lang="en-US" dirty="0" err="1">
                 <a:solidFill>
                   <a:schemeClr val="bg1">
                     <a:lumMod val="95000"/>
@@ -12715,7 +12190,7 @@
               <a:t>Person_Layout</a:t>
             </a:r>
             <a:r>
-              <a:rPr lang="en-US" dirty="0" smtClean="0">
+              <a:rPr lang="en-US" dirty="0">
                 <a:solidFill>
                   <a:schemeClr val="bg1">
                     <a:lumMod val="95000"/>
@@ -12729,7 +12204,7 @@
             </a:r>
           </a:p>
           <a:p>
-            <a:endParaRPr lang="en-US" dirty="0" smtClean="0">
+            <a:endParaRPr lang="en-US" dirty="0">
               <a:solidFill>
                 <a:schemeClr val="bg1">
                   <a:lumMod val="95000"/>
@@ -12742,7 +12217,7 @@
           </a:p>
           <a:p>
             <a:r>
-              <a:rPr lang="en-US" dirty="0" smtClean="0">
+              <a:rPr lang="en-US" dirty="0">
                 <a:solidFill>
                   <a:schemeClr val="bg1">
                     <a:lumMod val="95000"/>
@@ -12755,7 +12230,7 @@
               <a:t>L : Reference to </a:t>
             </a:r>
             <a:r>
-              <a:rPr lang="en-US" dirty="0" err="1" smtClean="0">
+              <a:rPr lang="en-US" dirty="0" err="1">
                 <a:solidFill>
                   <a:schemeClr val="bg1">
                     <a:lumMod val="95000"/>
@@ -12768,7 +12243,7 @@
               <a:t>Person_Layout</a:t>
             </a:r>
             <a:r>
-              <a:rPr lang="en-US" dirty="0" smtClean="0">
+              <a:rPr lang="en-US" dirty="0">
                 <a:solidFill>
                   <a:schemeClr val="bg1">
                     <a:lumMod val="95000"/>
@@ -12782,7 +12257,7 @@
             </a:r>
           </a:p>
           <a:p>
-            <a:endParaRPr lang="en-US" dirty="0" smtClean="0">
+            <a:endParaRPr lang="en-US" dirty="0">
               <a:solidFill>
                 <a:schemeClr val="bg1">
                   <a:lumMod val="95000"/>
@@ -12809,7 +12284,7 @@
             </a:r>
           </a:p>
           <a:p>
-            <a:endParaRPr lang="en-US" dirty="0" smtClean="0">
+            <a:endParaRPr lang="en-US" dirty="0">
               <a:solidFill>
                 <a:schemeClr val="bg1">
                   <a:lumMod val="95000"/>
@@ -12822,7 +12297,7 @@
           </a:p>
           <a:p>
             <a:r>
-              <a:rPr lang="en-US" dirty="0" smtClean="0">
+              <a:rPr lang="en-US" dirty="0">
                 <a:solidFill>
                   <a:schemeClr val="bg1">
                     <a:lumMod val="95000"/>
@@ -12834,16 +12309,6 @@
               </a:rPr>
               <a:t>C: Will do the Counting </a:t>
             </a:r>
-            <a:endParaRPr lang="en-US" dirty="0">
-              <a:solidFill>
-                <a:schemeClr val="bg1">
-                  <a:lumMod val="95000"/>
-                  <a:lumOff val="5000"/>
-                </a:schemeClr>
-              </a:solidFill>
-              <a:latin typeface="Calibri" panose="020F0502020204030204" pitchFamily="34" charset="0"/>
-              <a:cs typeface="Calibri" panose="020F0502020204030204" pitchFamily="34" charset="0"/>
-            </a:endParaRPr>
           </a:p>
         </p:txBody>
       </p:sp>
@@ -12869,7 +12334,7 @@
           <a:lstStyle/>
           <a:p>
             <a:r>
-              <a:rPr lang="en-US" sz="2800" b="1" dirty="0" smtClean="0">
+              <a:rPr lang="en-US" sz="2800" b="1" dirty="0">
                 <a:solidFill>
                   <a:srgbClr val="FF0000"/>
                 </a:solidFill>
@@ -13002,13 +12467,6 @@
   <p:clrMapOvr>
     <a:masterClrMapping/>
   </p:clrMapOvr>
-  <p:timing>
-    <p:tnLst>
-      <p:par>
-        <p:cTn id="1" dur="indefinite" restart="never" nodeType="tmRoot"/>
-      </p:par>
-    </p:tnLst>
-  </p:timing>
 </p:sld>
 </file>
 
@@ -13089,7 +12547,7 @@
           <a:lstStyle/>
           <a:p>
             <a:r>
-              <a:rPr lang="en-US" dirty="0" err="1" smtClean="0">
+              <a:rPr lang="en-US" dirty="0" err="1">
                 <a:solidFill>
                   <a:schemeClr val="bg1">
                     <a:lumMod val="95000"/>
@@ -13102,7 +12560,7 @@
               <a:t>CatRecs</a:t>
             </a:r>
             <a:r>
-              <a:rPr lang="en-US" dirty="0" smtClean="0">
+              <a:rPr lang="en-US" dirty="0">
                 <a:solidFill>
                   <a:schemeClr val="bg1">
                     <a:lumMod val="95000"/>
@@ -13129,7 +12587,7 @@
           </a:p>
           <a:p>
             <a:r>
-              <a:rPr lang="en-US" dirty="0" err="1" smtClean="0">
+              <a:rPr lang="en-US" dirty="0" err="1">
                 <a:solidFill>
                   <a:schemeClr val="bg1">
                     <a:lumMod val="95000"/>
@@ -13142,7 +12600,7 @@
               <a:t>NameDS</a:t>
             </a:r>
             <a:r>
-              <a:rPr lang="en-US" dirty="0" smtClean="0">
+              <a:rPr lang="en-US" dirty="0">
                 <a:solidFill>
                   <a:schemeClr val="bg1">
                     <a:lumMod val="95000"/>
@@ -13169,7 +12627,7 @@
           </a:p>
           <a:p>
             <a:r>
-              <a:rPr lang="en-US" dirty="0" err="1" smtClean="0">
+              <a:rPr lang="en-US" dirty="0" err="1">
                 <a:solidFill>
                   <a:schemeClr val="bg1">
                     <a:lumMod val="95000"/>
@@ -13182,7 +12640,7 @@
               <a:t>NameOutRec</a:t>
             </a:r>
             <a:r>
-              <a:rPr lang="en-US" dirty="0" smtClean="0">
+              <a:rPr lang="en-US" dirty="0">
                 <a:solidFill>
                   <a:schemeClr val="bg1">
                     <a:lumMod val="95000"/>
@@ -13209,7 +12667,7 @@
           </a:p>
           <a:p>
             <a:r>
-              <a:rPr lang="en-US" dirty="0" smtClean="0">
+              <a:rPr lang="en-US" dirty="0">
                 <a:solidFill>
                   <a:schemeClr val="bg1">
                     <a:lumMod val="95000"/>
@@ -13236,19 +12694,6 @@
           </a:p>
           <a:p>
             <a:r>
-              <a:rPr lang="en-US" dirty="0" smtClean="0">
-                <a:solidFill>
-                  <a:schemeClr val="bg1">
-                    <a:lumMod val="95000"/>
-                    <a:lumOff val="5000"/>
-                  </a:schemeClr>
-                </a:solidFill>
-                <a:latin typeface="Calibri" panose="020F0502020204030204" pitchFamily="34" charset="0"/>
-                <a:cs typeface="Calibri" panose="020F0502020204030204" pitchFamily="34" charset="0"/>
-              </a:rPr>
-              <a:t>SELF := LEFT</a:t>
-            </a:r>
-            <a:r>
               <a:rPr lang="en-US" dirty="0">
                 <a:solidFill>
                   <a:schemeClr val="bg1">
@@ -13259,33 +12704,7 @@
                 <a:latin typeface="Calibri" panose="020F0502020204030204" pitchFamily="34" charset="0"/>
                 <a:cs typeface="Calibri" panose="020F0502020204030204" pitchFamily="34" charset="0"/>
               </a:rPr>
-              <a:t>: </a:t>
-            </a:r>
-            <a:r>
-              <a:rPr lang="en-US" dirty="0" smtClean="0">
-                <a:solidFill>
-                  <a:schemeClr val="bg1">
-                    <a:lumMod val="95000"/>
-                    <a:lumOff val="5000"/>
-                  </a:schemeClr>
-                </a:solidFill>
-                <a:latin typeface="Calibri" panose="020F0502020204030204" pitchFamily="34" charset="0"/>
-                <a:cs typeface="Calibri" panose="020F0502020204030204" pitchFamily="34" charset="0"/>
-              </a:rPr>
-              <a:t>Assign </a:t>
-            </a:r>
-            <a:r>
-              <a:rPr lang="en-US" dirty="0">
-                <a:solidFill>
-                  <a:schemeClr val="bg1">
-                    <a:lumMod val="95000"/>
-                    <a:lumOff val="5000"/>
-                  </a:schemeClr>
-                </a:solidFill>
-                <a:latin typeface="Calibri" panose="020F0502020204030204" pitchFamily="34" charset="0"/>
-                <a:cs typeface="Calibri" panose="020F0502020204030204" pitchFamily="34" charset="0"/>
-              </a:rPr>
-              <a:t>everything with same field name from </a:t>
+              <a:t>SELF := LEFT: Assign everything with same field name from </a:t>
             </a:r>
             <a:r>
               <a:rPr lang="en-US" dirty="0" err="1">
@@ -13300,18 +12719,6 @@
               </a:rPr>
               <a:t>NameDS</a:t>
             </a:r>
-            <a:endParaRPr lang="en-US" dirty="0" smtClean="0">
-              <a:solidFill>
-                <a:schemeClr val="bg1">
-                  <a:lumMod val="95000"/>
-                  <a:lumOff val="5000"/>
-                </a:schemeClr>
-              </a:solidFill>
-              <a:latin typeface="Calibri" panose="020F0502020204030204" pitchFamily="34" charset="0"/>
-              <a:cs typeface="Calibri" panose="020F0502020204030204" pitchFamily="34" charset="0"/>
-            </a:endParaRPr>
-          </a:p>
-          <a:p>
             <a:endParaRPr lang="en-US" dirty="0">
               <a:solidFill>
                 <a:schemeClr val="bg1">
@@ -13324,8 +12731,20 @@
             </a:endParaRPr>
           </a:p>
           <a:p>
+            <a:endParaRPr lang="en-US" dirty="0">
+              <a:solidFill>
+                <a:schemeClr val="bg1">
+                  <a:lumMod val="95000"/>
+                  <a:lumOff val="5000"/>
+                </a:schemeClr>
+              </a:solidFill>
+              <a:latin typeface="Calibri" panose="020F0502020204030204" pitchFamily="34" charset="0"/>
+              <a:cs typeface="Calibri" panose="020F0502020204030204" pitchFamily="34" charset="0"/>
+            </a:endParaRPr>
+          </a:p>
+          <a:p>
             <a:r>
-              <a:rPr lang="en-US" dirty="0" smtClean="0">
+              <a:rPr lang="en-US" dirty="0">
                 <a:solidFill>
                   <a:schemeClr val="bg1">
                     <a:lumMod val="95000"/>
@@ -13337,16 +12756,6 @@
               </a:rPr>
               <a:t>SELF := []: All un-assigned fields will be set to default values</a:t>
             </a:r>
-            <a:endParaRPr lang="en-US" dirty="0">
-              <a:solidFill>
-                <a:schemeClr val="bg1">
-                  <a:lumMod val="95000"/>
-                  <a:lumOff val="5000"/>
-                </a:schemeClr>
-              </a:solidFill>
-              <a:latin typeface="Calibri" panose="020F0502020204030204" pitchFamily="34" charset="0"/>
-              <a:cs typeface="Calibri" panose="020F0502020204030204" pitchFamily="34" charset="0"/>
-            </a:endParaRPr>
           </a:p>
         </p:txBody>
       </p:sp>
@@ -13372,7 +12781,7 @@
           <a:lstStyle/>
           <a:p>
             <a:r>
-              <a:rPr lang="en-US" sz="2400" b="1" dirty="0" smtClean="0">
+              <a:rPr lang="en-US" sz="2400" b="1" dirty="0">
                 <a:solidFill>
                   <a:srgbClr val="FF0000"/>
                 </a:solidFill>
@@ -13505,13 +12914,6 @@
   <p:clrMapOvr>
     <a:masterClrMapping/>
   </p:clrMapOvr>
-  <p:timing>
-    <p:tnLst>
-      <p:par>
-        <p:cTn id="1" dur="indefinite" restart="never" nodeType="tmRoot"/>
-      </p:par>
-    </p:tnLst>
-  </p:timing>
 </p:sld>
 </file>
 
@@ -13558,7 +12960,7 @@
               <a:buNone/>
             </a:pPr>
             <a:r>
-              <a:rPr lang="en-US" sz="2400" b="1" dirty="0" smtClean="0">
+              <a:rPr lang="en-US" sz="2400" b="1" dirty="0">
                 <a:solidFill>
                   <a:srgbClr val="FF0000"/>
                 </a:solidFill>
@@ -13567,13 +12969,6 @@
               </a:rPr>
               <a:t>TABLE</a:t>
             </a:r>
-            <a:endParaRPr lang="en-US" sz="2400" b="1" dirty="0">
-              <a:solidFill>
-                <a:srgbClr val="FF0000"/>
-              </a:solidFill>
-              <a:latin typeface="Calibri" panose="020F0502020204030204" pitchFamily="34" charset="0"/>
-              <a:cs typeface="Calibri" panose="020F0502020204030204" pitchFamily="34" charset="0"/>
-            </a:endParaRPr>
           </a:p>
           <a:p>
             <a:pPr marL="0" indent="0">
@@ -13702,13 +13097,6 @@
   <p:clrMapOvr>
     <a:masterClrMapping/>
   </p:clrMapOvr>
-  <p:timing>
-    <p:tnLst>
-      <p:par>
-        <p:cTn id="1" dur="indefinite" restart="never" nodeType="tmRoot"/>
-      </p:par>
-    </p:tnLst>
-  </p:timing>
 </p:sld>
 </file>
 
@@ -13755,7 +13143,7 @@
               <a:buNone/>
             </a:pPr>
             <a:r>
-              <a:rPr lang="en-US" sz="3200" b="1" dirty="0" smtClean="0">
+              <a:rPr lang="en-US" sz="3200" b="1" dirty="0">
                 <a:solidFill>
                   <a:srgbClr val="FF0000"/>
                 </a:solidFill>
@@ -13764,13 +13152,6 @@
               </a:rPr>
               <a:t>JOIN</a:t>
             </a:r>
-            <a:endParaRPr lang="en-US" sz="3200" b="1" dirty="0">
-              <a:solidFill>
-                <a:srgbClr val="FF0000"/>
-              </a:solidFill>
-              <a:latin typeface="Calibri" panose="020F0502020204030204" pitchFamily="34" charset="0"/>
-              <a:cs typeface="Calibri" panose="020F0502020204030204" pitchFamily="34" charset="0"/>
-            </a:endParaRPr>
           </a:p>
         </p:txBody>
       </p:sp>
@@ -13857,18 +13238,7 @@
                   </a:schemeClr>
                 </a:solidFill>
               </a:rPr>
-              <a:t>: Only those records that exist in both datasets</a:t>
-            </a:r>
-            <a:r>
-              <a:rPr lang="en-US" dirty="0" smtClean="0">
-                <a:solidFill>
-                  <a:schemeClr val="tx1">
-                    <a:lumMod val="50000"/>
-                    <a:lumOff val="50000"/>
-                  </a:schemeClr>
-                </a:solidFill>
-              </a:rPr>
-              <a:t>.</a:t>
+              <a:t>: Only those records that exist in both datasets.</a:t>
             </a:r>
           </a:p>
           <a:p>
@@ -13899,18 +13269,7 @@
                   </a:schemeClr>
                 </a:solidFill>
               </a:rPr>
-              <a:t>: At least one record for every record in the left</a:t>
-            </a:r>
-            <a:r>
-              <a:rPr lang="en-US" dirty="0" smtClean="0">
-                <a:solidFill>
-                  <a:schemeClr val="tx1">
-                    <a:lumMod val="50000"/>
-                    <a:lumOff val="50000"/>
-                  </a:schemeClr>
-                </a:solidFill>
-              </a:rPr>
-              <a:t>.</a:t>
+              <a:t>: At least one record for every record in the left.</a:t>
             </a:r>
           </a:p>
           <a:p>
@@ -13941,18 +13300,7 @@
                   </a:schemeClr>
                 </a:solidFill>
               </a:rPr>
-              <a:t>: At least one record for every record in the right</a:t>
-            </a:r>
-            <a:r>
-              <a:rPr lang="en-US" dirty="0" smtClean="0">
-                <a:solidFill>
-                  <a:schemeClr val="tx1">
-                    <a:lumMod val="50000"/>
-                    <a:lumOff val="50000"/>
-                  </a:schemeClr>
-                </a:solidFill>
-              </a:rPr>
-              <a:t>.</a:t>
+              <a:t>: At least one record for every record in the right.</a:t>
             </a:r>
           </a:p>
           <a:p>
@@ -13983,18 +13331,7 @@
                   </a:schemeClr>
                 </a:solidFill>
               </a:rPr>
-              <a:t>: One record for each left record with no match in the left</a:t>
-            </a:r>
-            <a:r>
-              <a:rPr lang="en-US" dirty="0" smtClean="0">
-                <a:solidFill>
-                  <a:schemeClr val="tx1">
-                    <a:lumMod val="50000"/>
-                    <a:lumOff val="50000"/>
-                  </a:schemeClr>
-                </a:solidFill>
-              </a:rPr>
-              <a:t>.</a:t>
+              <a:t>: One record for each left record with no match in the left.</a:t>
             </a:r>
           </a:p>
           <a:p>
@@ -14025,18 +13362,7 @@
                   </a:schemeClr>
                 </a:solidFill>
               </a:rPr>
-              <a:t>: One record for each left record with no match in the right</a:t>
-            </a:r>
-            <a:r>
-              <a:rPr lang="en-US" dirty="0" smtClean="0">
-                <a:solidFill>
-                  <a:schemeClr val="tx1">
-                    <a:lumMod val="50000"/>
-                    <a:lumOff val="50000"/>
-                  </a:schemeClr>
-                </a:solidFill>
-              </a:rPr>
-              <a:t>.</a:t>
+              <a:t>: One record for each left record with no match in the right.</a:t>
             </a:r>
           </a:p>
           <a:p>
@@ -14102,13 +13428,6 @@
   <p:clrMapOvr>
     <a:masterClrMapping/>
   </p:clrMapOvr>
-  <p:timing>
-    <p:tnLst>
-      <p:par>
-        <p:cTn id="1" dur="indefinite" restart="never" nodeType="tmRoot"/>
-      </p:par>
-    </p:tnLst>
-  </p:timing>
 </p:sld>
 </file>
 
@@ -14553,13 +13872,6 @@
   <p:clrMapOvr>
     <a:masterClrMapping/>
   </p:clrMapOvr>
-  <p:timing>
-    <p:tnLst>
-      <p:par>
-        <p:cTn id="1" dur="indefinite" restart="never" nodeType="tmRoot"/>
-      </p:par>
-    </p:tnLst>
-  </p:timing>
 </p:sld>
 </file>
 
@@ -14606,7 +13918,7 @@
               <a:buNone/>
             </a:pPr>
             <a:r>
-              <a:rPr lang="en-US" sz="2400" b="1" dirty="0" smtClean="0">
+              <a:rPr lang="en-US" sz="2400" b="1" dirty="0">
                 <a:solidFill>
                   <a:srgbClr val="FF0000"/>
                 </a:solidFill>
@@ -14615,13 +13927,6 @@
               </a:rPr>
               <a:t>VISUALIZATION </a:t>
             </a:r>
-            <a:endParaRPr lang="en-US" sz="2400" b="1" dirty="0">
-              <a:solidFill>
-                <a:srgbClr val="FF0000"/>
-              </a:solidFill>
-              <a:latin typeface="Calibri" panose="020F0502020204030204" pitchFamily="34" charset="0"/>
-              <a:cs typeface="Calibri" panose="020F0502020204030204" pitchFamily="34" charset="0"/>
-            </a:endParaRPr>
           </a:p>
           <a:p>
             <a:pPr marL="0" indent="0">
@@ -14848,13 +14153,6 @@
   <p:clrMapOvr>
     <a:masterClrMapping/>
   </p:clrMapOvr>
-  <p:timing>
-    <p:tnLst>
-      <p:par>
-        <p:cTn id="1" dur="indefinite" restart="never" nodeType="tmRoot"/>
-      </p:par>
-    </p:tnLst>
-  </p:timing>
 </p:sld>
 </file>
 
@@ -15935,7 +15233,6 @@
               <a:schemeClr val="bg1"/>
             </a:solidFill>
           </a:ln>
-          <a:extLst/>
         </p:spPr>
         <p:txBody>
           <a:bodyPr vert="horz" wrap="square" lIns="91440" tIns="45720" rIns="91440" bIns="45720" numCol="1" anchor="t" anchorCtr="0" compatLnSpc="1">
@@ -20074,13 +19371,6 @@
   <p:clrMapOvr>
     <a:masterClrMapping/>
   </p:clrMapOvr>
-  <p:timing>
-    <p:tnLst>
-      <p:par>
-        <p:cTn id="1" dur="indefinite" restart="never" nodeType="tmRoot"/>
-      </p:par>
-    </p:tnLst>
-  </p:timing>
 </p:sld>
 </file>
 
@@ -20169,13 +19459,6 @@
   <p:clrMapOvr>
     <a:masterClrMapping/>
   </p:clrMapOvr>
-  <p:timing>
-    <p:tnLst>
-      <p:par>
-        <p:cTn id="1" dur="indefinite" restart="never" nodeType="tmRoot"/>
-      </p:par>
-    </p:tnLst>
-  </p:timing>
 </p:sld>
 </file>
 
@@ -20222,7 +19505,7 @@
               <a:buNone/>
             </a:pPr>
             <a:r>
-              <a:rPr lang="en-US" sz="2400" b="1" dirty="0" smtClean="0">
+              <a:rPr lang="en-US" sz="2400" b="1" dirty="0">
                 <a:solidFill>
                   <a:srgbClr val="FF0000"/>
                 </a:solidFill>
@@ -20231,13 +19514,6 @@
               </a:rPr>
               <a:t>REFRENCES </a:t>
             </a:r>
-            <a:endParaRPr lang="en-US" sz="2400" b="1" dirty="0">
-              <a:solidFill>
-                <a:srgbClr val="FF0000"/>
-              </a:solidFill>
-              <a:latin typeface="Calibri" panose="020F0502020204030204" pitchFamily="34" charset="0"/>
-              <a:cs typeface="Calibri" panose="020F0502020204030204" pitchFamily="34" charset="0"/>
-            </a:endParaRPr>
           </a:p>
           <a:p>
             <a:pPr marL="0" indent="0">
@@ -20276,15 +19552,7 @@
           <a:p>
             <a:r>
               <a:rPr lang="en-US" dirty="0"/>
-              <a:t>Github </a:t>
-            </a:r>
-            <a:r>
-              <a:rPr lang="en-US" dirty="0" smtClean="0"/>
-              <a:t> CodeDay</a:t>
-            </a:r>
-            <a:r>
-              <a:rPr lang="en-US" dirty="0"/>
-              <a:t>:</a:t>
+              <a:t>Github  CodeDay:</a:t>
             </a:r>
           </a:p>
           <a:p>
@@ -20292,15 +19560,9 @@
               <a:rPr lang="en-US" dirty="0">
                 <a:hlinkClick r:id="rId2"/>
               </a:rPr>
-              <a:t>https://</a:t>
+              <a:t>https://github.com/hpccsystems-solutions-lab/CodeDay_May2020</a:t>
             </a:r>
-            <a:r>
-              <a:rPr lang="en-US" dirty="0" smtClean="0">
-                <a:hlinkClick r:id="rId2"/>
-              </a:rPr>
-              <a:t>github.com/hpccsystems-solutions-lab/CodeDay_May2020</a:t>
-            </a:r>
-            <a:endParaRPr lang="en-US" dirty="0" smtClean="0"/>
+            <a:endParaRPr lang="en-US" dirty="0"/>
           </a:p>
           <a:p>
             <a:endParaRPr lang="en-US" dirty="0"/>
@@ -20316,25 +19578,18 @@
               <a:rPr lang="en-US" dirty="0">
                 <a:hlinkClick r:id="rId3"/>
               </a:rPr>
-              <a:t>https://</a:t>
+              <a:t>https://github.com/hpccsystems-solutions-lab/CodeDay_May2020/blob/master/ECL_Cheat_Sheet.pdf</a:t>
             </a:r>
+            <a:endParaRPr lang="en-US" dirty="0"/>
+          </a:p>
+          <a:p>
+            <a:endParaRPr lang="en-US" dirty="0"/>
+          </a:p>
+          <a:p>
             <a:r>
-              <a:rPr lang="en-US" dirty="0" smtClean="0">
-                <a:hlinkClick r:id="rId3"/>
-              </a:rPr>
-              <a:t>github.com/hpccsystems-solutions-lab/CodeDay_May2020/blob/master/ECL_Cheat_Sheet.pdf</a:t>
-            </a:r>
-            <a:endParaRPr lang="en-US" dirty="0" smtClean="0"/>
-          </a:p>
-          <a:p>
-            <a:endParaRPr lang="en-US" dirty="0"/>
-          </a:p>
-          <a:p>
-            <a:r>
-              <a:rPr lang="en-US" dirty="0" smtClean="0"/>
+              <a:rPr lang="en-US" dirty="0"/>
               <a:t>Cloud IDE setup</a:t>
             </a:r>
-            <a:endParaRPr lang="en-US" dirty="0"/>
           </a:p>
           <a:p>
             <a:r>
@@ -20350,57 +19605,57 @@
           </a:p>
           <a:p>
             <a:r>
-              <a:rPr lang="en-US" dirty="0" smtClean="0"/>
+              <a:rPr lang="en-US" dirty="0"/>
               <a:t>ECL training containing six short videos</a:t>
             </a:r>
           </a:p>
           <a:p>
             <a:r>
-              <a:rPr lang="en-US" dirty="0" smtClean="0">
+              <a:rPr lang="en-US" dirty="0">
                 <a:hlinkClick r:id="rId5"/>
               </a:rPr>
               <a:t>https://www.youtube.com/watch?time_continue=192&amp;v=Lk78BCCtM-0</a:t>
             </a:r>
-            <a:endParaRPr lang="en-US" dirty="0" smtClean="0"/>
-          </a:p>
-          <a:p>
-            <a:endParaRPr lang="en-US" dirty="0" smtClean="0"/>
+            <a:endParaRPr lang="en-US" dirty="0"/>
+          </a:p>
+          <a:p>
+            <a:endParaRPr lang="en-US" dirty="0"/>
           </a:p>
           <a:p>
             <a:r>
-              <a:rPr lang="en-US" dirty="0" smtClean="0"/>
+              <a:rPr lang="en-US" dirty="0"/>
               <a:t>ECL document</a:t>
             </a:r>
           </a:p>
           <a:p>
             <a:r>
-              <a:rPr lang="en-US" dirty="0" smtClean="0">
+              <a:rPr lang="en-US" dirty="0">
                 <a:hlinkClick r:id="rId6"/>
               </a:rPr>
               <a:t>http://cdn.hpccsystems.com/releases/CE-Candidate-7.0.24/docs/EN_US/ECLLanguageReference_EN_US-7.0.24-1.pdf</a:t>
             </a:r>
-            <a:endParaRPr lang="en-US" dirty="0" smtClean="0"/>
-          </a:p>
-          <a:p>
-            <a:endParaRPr lang="en-US" dirty="0" smtClean="0"/>
+            <a:endParaRPr lang="en-US" dirty="0"/>
+          </a:p>
+          <a:p>
+            <a:endParaRPr lang="en-US" dirty="0"/>
           </a:p>
           <a:p>
             <a:r>
-              <a:rPr lang="en-US" dirty="0" smtClean="0"/>
+              <a:rPr lang="en-US" dirty="0"/>
               <a:t>Visualization document</a:t>
             </a:r>
           </a:p>
           <a:p>
             <a:r>
-              <a:rPr lang="en-US" dirty="0" smtClean="0">
+              <a:rPr lang="en-US" dirty="0">
                 <a:hlinkClick r:id="rId7"/>
               </a:rPr>
               <a:t>https://d2wulyp08c6njk.cloudfront.net/releases/CE-Candidate-7.6.2/docs/EN_US/VisualizingECL_EN_US-7.6.2-1.pdf</a:t>
             </a:r>
-            <a:endParaRPr lang="en-US" dirty="0" smtClean="0"/>
-          </a:p>
-          <a:p>
-            <a:endParaRPr lang="en-US" dirty="0" smtClean="0"/>
+            <a:endParaRPr lang="en-US" dirty="0"/>
+          </a:p>
+          <a:p>
+            <a:endParaRPr lang="en-US" dirty="0"/>
           </a:p>
         </p:txBody>
       </p:sp>
@@ -20414,13 +19669,6 @@
   <p:clrMapOvr>
     <a:masterClrMapping/>
   </p:clrMapOvr>
-  <p:timing>
-    <p:tnLst>
-      <p:par>
-        <p:cTn id="1" dur="indefinite" restart="never" nodeType="tmRoot"/>
-      </p:par>
-    </p:tnLst>
-  </p:timing>
 </p:sld>
 </file>
 
@@ -20499,13 +19747,6 @@
   <p:clrMapOvr>
     <a:masterClrMapping/>
   </p:clrMapOvr>
-  <p:timing>
-    <p:tnLst>
-      <p:par>
-        <p:cTn id="1" dur="indefinite" restart="never" nodeType="tmRoot"/>
-      </p:par>
-    </p:tnLst>
-  </p:timing>
 </p:sld>
 </file>
 
@@ -20592,13 +19833,6 @@
   <p:clrMapOvr>
     <a:masterClrMapping/>
   </p:clrMapOvr>
-  <p:timing>
-    <p:tnLst>
-      <p:par>
-        <p:cTn id="1" dur="indefinite" restart="never" nodeType="tmRoot"/>
-      </p:par>
-    </p:tnLst>
-  </p:timing>
 </p:sld>
 </file>
 
@@ -32935,13 +32169,6 @@
   <p:clrMapOvr>
     <a:masterClrMapping/>
   </p:clrMapOvr>
-  <p:timing>
-    <p:tnLst>
-      <p:par>
-        <p:cTn id="1" dur="indefinite" restart="never" nodeType="tmRoot"/>
-      </p:par>
-    </p:tnLst>
-  </p:timing>
 </p:sld>
 </file>
 
@@ -36939,7 +36166,7 @@
               <a:buNone/>
             </a:pPr>
             <a:r>
-              <a:rPr lang="en-US" dirty="0" smtClean="0">
+              <a:rPr lang="en-US" dirty="0">
                 <a:latin typeface="Calibri" panose="020F0502020204030204" pitchFamily="34" charset="0"/>
                 <a:cs typeface="Calibri" panose="020F0502020204030204" pitchFamily="34" charset="0"/>
               </a:rPr>
@@ -36953,17 +36180,7 @@
                 <a:latin typeface="Calibri" panose="020F0502020204030204" pitchFamily="34" charset="0"/>
                 <a:cs typeface="Calibri" panose="020F0502020204030204" pitchFamily="34" charset="0"/>
               </a:rPr>
-              <a:t>ECL Cloud </a:t>
-            </a:r>
-            <a:r>
-              <a:rPr lang="en-US" dirty="0" smtClean="0">
-                <a:solidFill>
-                  <a:srgbClr val="FF0000"/>
-                </a:solidFill>
-                <a:latin typeface="Calibri" panose="020F0502020204030204" pitchFamily="34" charset="0"/>
-                <a:cs typeface="Calibri" panose="020F0502020204030204" pitchFamily="34" charset="0"/>
-              </a:rPr>
-              <a:t>IDE</a:t>
+              <a:t>ECL Cloud IDE</a:t>
             </a:r>
           </a:p>
           <a:p>
@@ -36978,17 +36195,7 @@
                 <a:latin typeface="Calibri" panose="020F0502020204030204" pitchFamily="34" charset="0"/>
                 <a:cs typeface="Calibri" panose="020F0502020204030204" pitchFamily="34" charset="0"/>
               </a:rPr>
-              <a:t>	</a:t>
-            </a:r>
-            <a:r>
-              <a:rPr lang="en-US" dirty="0" smtClean="0">
-                <a:solidFill>
-                  <a:srgbClr val="FF0000"/>
-                </a:solidFill>
-                <a:latin typeface="Calibri" panose="020F0502020204030204" pitchFamily="34" charset="0"/>
-                <a:cs typeface="Calibri" panose="020F0502020204030204" pitchFamily="34" charset="0"/>
-              </a:rPr>
-              <a:t>	</a:t>
+              <a:t>		</a:t>
             </a:r>
           </a:p>
           <a:p>
@@ -36996,7 +36203,7 @@
               <a:buNone/>
             </a:pPr>
             <a:r>
-              <a:rPr lang="en-US" dirty="0" smtClean="0">
+              <a:rPr lang="en-US" dirty="0">
                 <a:solidFill>
                   <a:srgbClr val="FF0000"/>
                 </a:solidFill>
@@ -37006,20 +36213,12 @@
               <a:t> </a:t>
             </a:r>
             <a:r>
-              <a:rPr lang="en-US" dirty="0" smtClean="0">
-                <a:latin typeface="Calibri" panose="020F0502020204030204" pitchFamily="34" charset="0"/>
-                <a:cs typeface="Calibri" panose="020F0502020204030204" pitchFamily="34" charset="0"/>
-                <a:hlinkClick r:id="rId2"/>
-              </a:rPr>
-              <a:t>https</a:t>
-            </a:r>
-            <a:r>
               <a:rPr lang="en-US" dirty="0">
                 <a:latin typeface="Calibri" panose="020F0502020204030204" pitchFamily="34" charset="0"/>
                 <a:cs typeface="Calibri" panose="020F0502020204030204" pitchFamily="34" charset="0"/>
                 <a:hlinkClick r:id="rId2"/>
               </a:rPr>
-              <a:t>://ide.hpccsystems.com/auth/login</a:t>
+              <a:t>https://ide.hpccsystems.com/auth/login</a:t>
             </a:r>
             <a:r>
               <a:rPr lang="en-US" dirty="0">
@@ -37130,13 +36329,6 @@
   <p:clrMapOvr>
     <a:masterClrMapping/>
   </p:clrMapOvr>
-  <p:timing>
-    <p:tnLst>
-      <p:par>
-        <p:cTn id="1" dur="indefinite" restart="never" nodeType="tmRoot"/>
-      </p:par>
-    </p:tnLst>
-  </p:timing>
 </p:sld>
 </file>
 
@@ -37275,20 +36467,7 @@
                 <a:latin typeface="Calibri" panose="020F0502020204030204" pitchFamily="34" charset="0"/>
                 <a:cs typeface="Calibri" panose="020F0502020204030204" pitchFamily="34" charset="0"/>
               </a:rPr>
-              <a:t>Please see </a:t>
-            </a:r>
-            <a:r>
-              <a:rPr lang="en-US" sz="2000" dirty="0" smtClean="0">
-                <a:solidFill>
-                  <a:schemeClr val="tx1">
-                    <a:lumMod val="65000"/>
-                    <a:lumOff val="35000"/>
-                  </a:schemeClr>
-                </a:solidFill>
-                <a:latin typeface="Calibri" panose="020F0502020204030204" pitchFamily="34" charset="0"/>
-                <a:cs typeface="Calibri" panose="020F0502020204030204" pitchFamily="34" charset="0"/>
-              </a:rPr>
-              <a:t>following for how to register and tutorial </a:t>
+              <a:t>Please see following for how to register and tutorial </a:t>
             </a:r>
           </a:p>
           <a:p>
@@ -37301,7 +36480,7 @@
               <a:t>https://github.com/hpccsystems-solutions-lab</a:t>
             </a:r>
             <a:r>
-              <a:rPr lang="en-US" sz="2000" dirty="0" smtClean="0">
+              <a:rPr lang="en-US" sz="2000" dirty="0">
                 <a:latin typeface="Calibri" panose="020F0502020204030204" pitchFamily="34" charset="0"/>
                 <a:cs typeface="Calibri" panose="020F0502020204030204" pitchFamily="34" charset="0"/>
                 <a:hlinkClick r:id="rId4"/>
@@ -37376,13 +36555,6 @@
   <p:clrMapOvr>
     <a:masterClrMapping/>
   </p:clrMapOvr>
-  <p:timing>
-    <p:tnLst>
-      <p:par>
-        <p:cTn id="1" dur="indefinite" restart="never" nodeType="tmRoot"/>
-      </p:par>
-    </p:tnLst>
-  </p:timing>
 </p:sld>
 </file>
 

</xml_diff>